<commit_message>
updates to ppt1 Welcome
</commit_message>
<xml_diff>
--- a/presentations/1 - Welcome and motivation.pptx
+++ b/presentations/1 - Welcome and motivation.pptx
@@ -5,7 +5,7 @@
     <p:sldMasterId id="2147483648" r:id="rId1"/>
   </p:sldMasterIdLst>
   <p:notesMasterIdLst>
-    <p:notesMasterId r:id="rId18"/>
+    <p:notesMasterId r:id="rId17"/>
   </p:notesMasterIdLst>
   <p:sldIdLst>
     <p:sldId id="256" r:id="rId2"/>
@@ -14,16 +14,15 @@
     <p:sldId id="405" r:id="rId5"/>
     <p:sldId id="434" r:id="rId6"/>
     <p:sldId id="402" r:id="rId7"/>
-    <p:sldId id="383" r:id="rId8"/>
-    <p:sldId id="401" r:id="rId9"/>
-    <p:sldId id="331" r:id="rId10"/>
-    <p:sldId id="431" r:id="rId11"/>
-    <p:sldId id="332" r:id="rId12"/>
-    <p:sldId id="412" r:id="rId13"/>
-    <p:sldId id="430" r:id="rId14"/>
-    <p:sldId id="297" r:id="rId15"/>
-    <p:sldId id="313" r:id="rId16"/>
-    <p:sldId id="429" r:id="rId17"/>
+    <p:sldId id="435" r:id="rId8"/>
+    <p:sldId id="331" r:id="rId9"/>
+    <p:sldId id="431" r:id="rId10"/>
+    <p:sldId id="332" r:id="rId11"/>
+    <p:sldId id="412" r:id="rId12"/>
+    <p:sldId id="430" r:id="rId13"/>
+    <p:sldId id="297" r:id="rId14"/>
+    <p:sldId id="313" r:id="rId15"/>
+    <p:sldId id="429" r:id="rId16"/>
   </p:sldIdLst>
   <p:sldSz cx="12192000" cy="6858000"/>
   <p:notesSz cx="6858000" cy="9144000"/>
@@ -137,8 +136,7 @@
             <p14:sldId id="405"/>
             <p14:sldId id="434"/>
             <p14:sldId id="402"/>
-            <p14:sldId id="383"/>
-            <p14:sldId id="401"/>
+            <p14:sldId id="435"/>
             <p14:sldId id="331"/>
             <p14:sldId id="431"/>
             <p14:sldId id="332"/>
@@ -240,7 +238,7 @@
           <a:p>
             <a:fld id="{EC387D8F-AD3F-4F1D-953F-F6D09F384E03}" type="datetimeFigureOut">
               <a:rPr lang="en-US" smtClean="0"/>
-              <a:t>12/11/2023</a:t>
+              <a:t>3/28/2025</a:t>
             </a:fld>
             <a:endParaRPr lang="en-US"/>
           </a:p>
@@ -635,18 +633,6 @@
           <a:bodyPr/>
           <a:lstStyle/>
           <a:p>
-            <a:r>
-              <a:rPr lang="en-US" dirty="0"/>
-              <a:t>Because of this, the slides are intentionally a little bit wordy. I apologize for that as it makes the aesthetics worse but I want this document to serve a little bit as a reference guide for you. </a:t>
-            </a:r>
-          </a:p>
-          <a:p>
-            <a:r>
-              <a:rPr lang="en-US" dirty="0"/>
-              <a:t>Today might be slow but we’re laying the foundation for charts &amp; modeling</a:t>
-            </a:r>
-          </a:p>
-          <a:p>
             <a:pPr marL="0" marR="0" lvl="0" indent="0" algn="l" defTabSz="914400" rtl="0" eaLnBrk="1" fontAlgn="auto" latinLnBrk="0" hangingPunct="1">
               <a:lnSpc>
                 <a:spcPct val="100000"/>
@@ -666,8 +652,57 @@
             </a:pPr>
             <a:r>
               <a:rPr lang="en-US" dirty="0"/>
-              <a:t>Not everyone needs to be an expert, but if you’re here, I want you to move up a level and at least be able to “read” R</a:t>
+              <a:t>Teaching philosophy thanks to:</a:t>
             </a:r>
+          </a:p>
+          <a:p>
+            <a:pPr marL="0" marR="0" lvl="0" indent="0" algn="l" defTabSz="914400" rtl="0" eaLnBrk="1" fontAlgn="auto" latinLnBrk="0" hangingPunct="1">
+              <a:lnSpc>
+                <a:spcPct val="100000"/>
+              </a:lnSpc>
+              <a:spcBef>
+                <a:spcPts val="0"/>
+              </a:spcBef>
+              <a:spcAft>
+                <a:spcPts val="0"/>
+              </a:spcAft>
+              <a:buClrTx/>
+              <a:buSzTx/>
+              <a:buFontTx/>
+              <a:buNone/>
+              <a:tabLst/>
+              <a:defRPr/>
+            </a:pPr>
+            <a:r>
+              <a:rPr lang="en-US" dirty="0"/>
+              <a:t>http://teachtogether.tech/en/index.html</a:t>
+            </a:r>
+          </a:p>
+          <a:p>
+            <a:pPr marL="0" marR="0" lvl="0" indent="0" algn="l" defTabSz="914400" rtl="0" eaLnBrk="1" fontAlgn="auto" latinLnBrk="0" hangingPunct="1">
+              <a:lnSpc>
+                <a:spcPct val="100000"/>
+              </a:lnSpc>
+              <a:spcBef>
+                <a:spcPts val="0"/>
+              </a:spcBef>
+              <a:spcAft>
+                <a:spcPts val="0"/>
+              </a:spcAft>
+              <a:buClrTx/>
+              <a:buSzTx/>
+              <a:buFontTx/>
+              <a:buNone/>
+              <a:tabLst/>
+              <a:defRPr/>
+            </a:pPr>
+            <a:r>
+              <a:rPr lang="en-US" dirty="0"/>
+              <a:t>https://journals.plos.org/ploscompbiol/article?id=10.1371/journal.pcbi.1006023</a:t>
+            </a:r>
+          </a:p>
+          <a:p>
+            <a:endParaRPr lang="en-US" dirty="0"/>
           </a:p>
         </p:txBody>
       </p:sp>
@@ -697,7 +732,7 @@
     </p:spTree>
     <p:extLst>
       <p:ext uri="{BB962C8B-B14F-4D97-AF65-F5344CB8AC3E}">
-        <p14:creationId xmlns:p14="http://schemas.microsoft.com/office/powerpoint/2010/main" val="2465146486"/>
+        <p14:creationId xmlns:p14="http://schemas.microsoft.com/office/powerpoint/2010/main" val="99746442"/>
       </p:ext>
     </p:extLst>
   </p:cSld>
@@ -751,76 +786,16 @@
           <a:bodyPr/>
           <a:lstStyle/>
           <a:p>
-            <a:pPr marL="0" marR="0" lvl="0" indent="0" algn="l" defTabSz="914400" rtl="0" eaLnBrk="1" fontAlgn="auto" latinLnBrk="0" hangingPunct="1">
-              <a:lnSpc>
-                <a:spcPct val="100000"/>
-              </a:lnSpc>
-              <a:spcBef>
-                <a:spcPts val="0"/>
-              </a:spcBef>
-              <a:spcAft>
-                <a:spcPts val="0"/>
-              </a:spcAft>
-              <a:buClrTx/>
-              <a:buSzTx/>
-              <a:buFontTx/>
-              <a:buNone/>
-              <a:tabLst/>
-              <a:defRPr/>
-            </a:pPr>
             <a:r>
               <a:rPr lang="en-US" dirty="0"/>
-              <a:t>Teaching philosophy thanks to:</a:t>
+              <a:t>These points are so important that I’m going to reiterate them again here. </a:t>
             </a:r>
           </a:p>
           <a:p>
-            <a:pPr marL="0" marR="0" lvl="0" indent="0" algn="l" defTabSz="914400" rtl="0" eaLnBrk="1" fontAlgn="auto" latinLnBrk="0" hangingPunct="1">
-              <a:lnSpc>
-                <a:spcPct val="100000"/>
-              </a:lnSpc>
-              <a:spcBef>
-                <a:spcPts val="0"/>
-              </a:spcBef>
-              <a:spcAft>
-                <a:spcPts val="0"/>
-              </a:spcAft>
-              <a:buClrTx/>
-              <a:buSzTx/>
-              <a:buFontTx/>
-              <a:buNone/>
-              <a:tabLst/>
-              <a:defRPr/>
-            </a:pPr>
             <a:r>
               <a:rPr lang="en-US" dirty="0"/>
-              <a:t>http://teachtogether.tech/en/index.html</a:t>
+              <a:t>This point, especially the last one, can be the difference between success and frustration. </a:t>
             </a:r>
-          </a:p>
-          <a:p>
-            <a:pPr marL="0" marR="0" lvl="0" indent="0" algn="l" defTabSz="914400" rtl="0" eaLnBrk="1" fontAlgn="auto" latinLnBrk="0" hangingPunct="1">
-              <a:lnSpc>
-                <a:spcPct val="100000"/>
-              </a:lnSpc>
-              <a:spcBef>
-                <a:spcPts val="0"/>
-              </a:spcBef>
-              <a:spcAft>
-                <a:spcPts val="0"/>
-              </a:spcAft>
-              <a:buClrTx/>
-              <a:buSzTx/>
-              <a:buFontTx/>
-              <a:buNone/>
-              <a:tabLst/>
-              <a:defRPr/>
-            </a:pPr>
-            <a:r>
-              <a:rPr lang="en-US" dirty="0"/>
-              <a:t>https://journals.plos.org/ploscompbiol/article?id=10.1371/journal.pcbi.1006023</a:t>
-            </a:r>
-          </a:p>
-          <a:p>
-            <a:endParaRPr lang="en-US" dirty="0"/>
           </a:p>
         </p:txBody>
       </p:sp>
@@ -842,99 +817,6 @@
             <a:fld id="{AD86E2D3-8F12-4CB7-B6F3-018CFC08298B}" type="slidenum">
               <a:rPr lang="en-US" smtClean="0"/>
               <a:t>15</a:t>
-            </a:fld>
-            <a:endParaRPr lang="en-US"/>
-          </a:p>
-        </p:txBody>
-      </p:sp>
-    </p:spTree>
-    <p:extLst>
-      <p:ext uri="{BB962C8B-B14F-4D97-AF65-F5344CB8AC3E}">
-        <p14:creationId xmlns:p14="http://schemas.microsoft.com/office/powerpoint/2010/main" val="99746442"/>
-      </p:ext>
-    </p:extLst>
-  </p:cSld>
-  <p:clrMapOvr>
-    <a:masterClrMapping/>
-  </p:clrMapOvr>
-</p:notes>
-</file>
-
-<file path=ppt/notesSlides/notesSlide12.xml><?xml version="1.0" encoding="utf-8"?>
-<p:notes xmlns:a="http://schemas.openxmlformats.org/drawingml/2006/main" xmlns:r="http://schemas.openxmlformats.org/officeDocument/2006/relationships" xmlns:p="http://schemas.openxmlformats.org/presentationml/2006/main">
-  <p:cSld>
-    <p:spTree>
-      <p:nvGrpSpPr>
-        <p:cNvPr id="1" name=""/>
-        <p:cNvGrpSpPr/>
-        <p:nvPr/>
-      </p:nvGrpSpPr>
-      <p:grpSpPr>
-        <a:xfrm>
-          <a:off x="0" y="0"/>
-          <a:ext cx="0" cy="0"/>
-          <a:chOff x="0" y="0"/>
-          <a:chExt cx="0" cy="0"/>
-        </a:xfrm>
-      </p:grpSpPr>
-      <p:sp>
-        <p:nvSpPr>
-          <p:cNvPr id="2" name="Slide Image Placeholder 1"/>
-          <p:cNvSpPr>
-            <a:spLocks noGrp="1" noRot="1" noChangeAspect="1"/>
-          </p:cNvSpPr>
-          <p:nvPr>
-            <p:ph type="sldImg"/>
-          </p:nvPr>
-        </p:nvSpPr>
-        <p:spPr/>
-      </p:sp>
-      <p:sp>
-        <p:nvSpPr>
-          <p:cNvPr id="3" name="Notes Placeholder 2"/>
-          <p:cNvSpPr>
-            <a:spLocks noGrp="1"/>
-          </p:cNvSpPr>
-          <p:nvPr>
-            <p:ph type="body" idx="1"/>
-          </p:nvPr>
-        </p:nvSpPr>
-        <p:spPr/>
-        <p:txBody>
-          <a:bodyPr/>
-          <a:lstStyle/>
-          <a:p>
-            <a:r>
-              <a:rPr lang="en-US" dirty="0"/>
-              <a:t>These points are so important that I’m going to reiterate them again here. </a:t>
-            </a:r>
-          </a:p>
-          <a:p>
-            <a:r>
-              <a:rPr lang="en-US" dirty="0"/>
-              <a:t>This point, especially the last one, can be the difference between success and frustration. </a:t>
-            </a:r>
-          </a:p>
-        </p:txBody>
-      </p:sp>
-      <p:sp>
-        <p:nvSpPr>
-          <p:cNvPr id="4" name="Slide Number Placeholder 3"/>
-          <p:cNvSpPr>
-            <a:spLocks noGrp="1"/>
-          </p:cNvSpPr>
-          <p:nvPr>
-            <p:ph type="sldNum" sz="quarter" idx="5"/>
-          </p:nvPr>
-        </p:nvSpPr>
-        <p:spPr/>
-        <p:txBody>
-          <a:bodyPr/>
-          <a:lstStyle/>
-          <a:p>
-            <a:fld id="{AD86E2D3-8F12-4CB7-B6F3-018CFC08298B}" type="slidenum">
-              <a:rPr lang="en-US" smtClean="0"/>
-              <a:t>16</a:t>
             </a:fld>
             <a:endParaRPr lang="en-US"/>
           </a:p>
@@ -1168,24 +1050,7 @@
           <a:bodyPr/>
           <a:lstStyle/>
           <a:p>
-            <a:r>
-              <a:rPr lang="en-US" dirty="0"/>
-              <a:t>In the first section we’ll go over what R is, the basic overview of the “grammar” used, and some simple commands. For this first section, it will mostly be </a:t>
-            </a:r>
-            <a:r>
-              <a:rPr lang="en-US" dirty="0" err="1"/>
-              <a:t>powerpoint</a:t>
-            </a:r>
-            <a:r>
-              <a:rPr lang="en-US" dirty="0"/>
-              <a:t> based so follow along with the slideshow. </a:t>
-            </a:r>
-          </a:p>
-          <a:p>
-            <a:r>
-              <a:rPr lang="en-US" dirty="0"/>
-              <a:t>In sections 2 through 4 we’ll cover more about how to understand what R is and how to get it to do what you want. These are broken into individual script files for each section so that you may follow along. We’ll build a little bit more on the foundations previously learned with each section.</a:t>
-            </a:r>
+            <a:endParaRPr lang="en-US" dirty="0"/>
           </a:p>
         </p:txBody>
       </p:sp>
@@ -1204,7 +1069,7 @@
           <a:bodyPr/>
           <a:lstStyle/>
           <a:p>
-            <a:fld id="{AD86E2D3-8F12-4CB7-B6F3-018CFC08298B}" type="slidenum">
+            <a:fld id="{2D3618BD-5D63-447F-BEC2-3BD80D62BA09}" type="slidenum">
               <a:rPr lang="en-US" smtClean="0"/>
               <a:t>7</a:t>
             </a:fld>
@@ -1215,7 +1080,7 @@
     </p:spTree>
     <p:extLst>
       <p:ext uri="{BB962C8B-B14F-4D97-AF65-F5344CB8AC3E}">
-        <p14:creationId xmlns:p14="http://schemas.microsoft.com/office/powerpoint/2010/main" val="634339299"/>
+        <p14:creationId xmlns:p14="http://schemas.microsoft.com/office/powerpoint/2010/main" val="738290698"/>
       </p:ext>
     </p:extLst>
   </p:cSld>
@@ -1271,14 +1136,23 @@
           <a:p>
             <a:r>
               <a:rPr lang="en-US" dirty="0"/>
-              <a:t>Just so we have a little bit of a roadmap, here’s tomorrow’s schedule</a:t>
+              <a:t>it’s worth taking a moment to motivate what we’re doing.  Chances are, you’re a very proficient Excel user, and you’re good at your job.  And here we are pushing this new thing, so it’s worth talking about WHY.</a:t>
             </a:r>
+          </a:p>
+          <a:p>
+            <a:endParaRPr lang="en-US" dirty="0"/>
           </a:p>
           <a:p>
             <a:r>
               <a:rPr lang="en-US" dirty="0"/>
-              <a:t>Don’t stress too much about your final project. You won’t have to present it and nothing needs to be shared</a:t>
+              <a:t>So without going into the statistical and graphical tools that R provides, I’d just like to talk about reproducibility…</a:t>
             </a:r>
+          </a:p>
+          <a:p>
+            <a:endParaRPr lang="en-US" dirty="0"/>
+          </a:p>
+          <a:p>
+            <a:endParaRPr lang="en-US" dirty="0"/>
           </a:p>
         </p:txBody>
       </p:sp>
@@ -1297,7 +1171,7 @@
           <a:bodyPr/>
           <a:lstStyle/>
           <a:p>
-            <a:fld id="{AD86E2D3-8F12-4CB7-B6F3-018CFC08298B}" type="slidenum">
+            <a:fld id="{2D3618BD-5D63-447F-BEC2-3BD80D62BA09}" type="slidenum">
               <a:rPr lang="en-US" smtClean="0"/>
               <a:t>8</a:t>
             </a:fld>
@@ -1308,7 +1182,7 @@
     </p:spTree>
     <p:extLst>
       <p:ext uri="{BB962C8B-B14F-4D97-AF65-F5344CB8AC3E}">
-        <p14:creationId xmlns:p14="http://schemas.microsoft.com/office/powerpoint/2010/main" val="76548694"/>
+        <p14:creationId xmlns:p14="http://schemas.microsoft.com/office/powerpoint/2010/main" val="1489899700"/>
       </p:ext>
     </p:extLst>
   </p:cSld>
@@ -1362,22 +1236,27 @@
           <a:bodyPr/>
           <a:lstStyle/>
           <a:p>
+            <a:pPr marL="0" marR="0" lvl="0" indent="0" algn="l" defTabSz="914400" rtl="0" eaLnBrk="1" fontAlgn="auto" latinLnBrk="0" hangingPunct="1">
+              <a:lnSpc>
+                <a:spcPct val="100000"/>
+              </a:lnSpc>
+              <a:spcBef>
+                <a:spcPts val="0"/>
+              </a:spcBef>
+              <a:spcAft>
+                <a:spcPts val="0"/>
+              </a:spcAft>
+              <a:buClrTx/>
+              <a:buSzTx/>
+              <a:buFontTx/>
+              <a:buNone/>
+              <a:tabLst/>
+              <a:defRPr/>
+            </a:pPr>
             <a:r>
               <a:rPr lang="en-US" dirty="0"/>
-              <a:t>it’s worth taking a moment to motivate what we’re doing.  Chances are, you’re a very proficient Excel user, and you’re good at your job.  And here we are pushing this new thing, so it’s worth talking about WHY.</a:t>
+              <a:t>“anything that CAN be automated, SHOULD be automated”</a:t>
             </a:r>
-          </a:p>
-          <a:p>
-            <a:endParaRPr lang="en-US" dirty="0"/>
-          </a:p>
-          <a:p>
-            <a:r>
-              <a:rPr lang="en-US" dirty="0"/>
-              <a:t>So without going into the statistical and graphical tools that R provides, I’d just like to talk about reproducibility…</a:t>
-            </a:r>
-          </a:p>
-          <a:p>
-            <a:endParaRPr lang="en-US" dirty="0"/>
           </a:p>
           <a:p>
             <a:endParaRPr lang="en-US" dirty="0"/>
@@ -1410,7 +1289,7 @@
     </p:spTree>
     <p:extLst>
       <p:ext uri="{BB962C8B-B14F-4D97-AF65-F5344CB8AC3E}">
-        <p14:creationId xmlns:p14="http://schemas.microsoft.com/office/powerpoint/2010/main" val="1489899700"/>
+        <p14:creationId xmlns:p14="http://schemas.microsoft.com/office/powerpoint/2010/main" val="870374245"/>
       </p:ext>
     </p:extLst>
   </p:cSld>
@@ -1483,7 +1362,15 @@
             </a:pPr>
             <a:r>
               <a:rPr lang="en-US" dirty="0"/>
-              <a:t>“anything that CAN be automated, SHOULD be automated”</a:t>
+              <a:t>So why R?  Why not SAS, or </a:t>
+            </a:r>
+            <a:r>
+              <a:rPr lang="en-US" dirty="0" err="1"/>
+              <a:t>Matlab</a:t>
+            </a:r>
+            <a:r>
+              <a:rPr lang="en-US" dirty="0"/>
+              <a:t>, or C++, or any other script-based tool?</a:t>
             </a:r>
           </a:p>
           <a:p>
@@ -1517,7 +1404,7 @@
     </p:spTree>
     <p:extLst>
       <p:ext uri="{BB962C8B-B14F-4D97-AF65-F5344CB8AC3E}">
-        <p14:creationId xmlns:p14="http://schemas.microsoft.com/office/powerpoint/2010/main" val="870374245"/>
+        <p14:creationId xmlns:p14="http://schemas.microsoft.com/office/powerpoint/2010/main" val="1353162103"/>
       </p:ext>
     </p:extLst>
   </p:cSld>
@@ -1571,38 +1458,35 @@
           <a:bodyPr/>
           <a:lstStyle/>
           <a:p>
-            <a:pPr marL="0" marR="0" lvl="0" indent="0" algn="l" defTabSz="914400" rtl="0" eaLnBrk="1" fontAlgn="auto" latinLnBrk="0" hangingPunct="1">
-              <a:lnSpc>
-                <a:spcPct val="100000"/>
-              </a:lnSpc>
-              <a:spcBef>
-                <a:spcPts val="0"/>
-              </a:spcBef>
-              <a:spcAft>
-                <a:spcPts val="0"/>
-              </a:spcAft>
-              <a:buClrTx/>
-              <a:buSzTx/>
-              <a:buFontTx/>
-              <a:buNone/>
-              <a:tabLst/>
-              <a:defRPr/>
-            </a:pPr>
             <a:r>
               <a:rPr lang="en-US" dirty="0"/>
-              <a:t>So why R?  Why not SAS, or </a:t>
+              <a:t>So to set the stage for the next couple days, it’s really useful to approach this like learning a new LANGUAGE.  Which … it is.</a:t>
+            </a:r>
+          </a:p>
+          <a:p>
+            <a:endParaRPr lang="en-US" dirty="0"/>
+          </a:p>
+          <a:p>
+            <a:r>
+              <a:rPr lang="en-US" dirty="0"/>
+              <a:t>In that: it’s necessary to learn new vocab AND new grammar rules at the same time, otherwise it doesn’t make sense.  So be patient with yourselves, because it’s a stretch!</a:t>
+            </a:r>
+          </a:p>
+          <a:p>
+            <a:endParaRPr lang="en-US" dirty="0"/>
+          </a:p>
+          <a:p>
+            <a:r>
+              <a:rPr lang="en-US" dirty="0"/>
+              <a:t>Also, it’s really only possible with immersion, and it won’t REALLY make sense until you USE it.  </a:t>
             </a:r>
             <a:r>
-              <a:rPr lang="en-US" dirty="0" err="1"/>
-              <a:t>Matlab</a:t>
+              <a:rPr lang="en-US"/>
+              <a:t>And ideally, when you use it on your OWN stuff!</a:t>
             </a:r>
-            <a:r>
-              <a:rPr lang="en-US" dirty="0"/>
-              <a:t>, or C++, or any other script-based tool?</a:t>
-            </a:r>
-          </a:p>
-          <a:p>
-            <a:endParaRPr lang="en-US" dirty="0"/>
+          </a:p>
+          <a:p>
+            <a:endParaRPr lang="en-US"/>
           </a:p>
         </p:txBody>
       </p:sp>
@@ -1632,7 +1516,7 @@
     </p:spTree>
     <p:extLst>
       <p:ext uri="{BB962C8B-B14F-4D97-AF65-F5344CB8AC3E}">
-        <p14:creationId xmlns:p14="http://schemas.microsoft.com/office/powerpoint/2010/main" val="1353162103"/>
+        <p14:creationId xmlns:p14="http://schemas.microsoft.com/office/powerpoint/2010/main" val="443200328"/>
       </p:ext>
     </p:extLst>
   </p:cSld>
@@ -1688,33 +1572,37 @@
           <a:p>
             <a:r>
               <a:rPr lang="en-US" dirty="0"/>
-              <a:t>So to set the stage for the next couple days, it’s really useful to approach this like learning a new LANGUAGE.  Which … it is.</a:t>
+              <a:t>Because of this, the slides are intentionally a little bit wordy. I apologize for that as it makes the aesthetics worse but I want this document to serve a little bit as a reference guide for you. </a:t>
             </a:r>
-          </a:p>
-          <a:p>
-            <a:endParaRPr lang="en-US" dirty="0"/>
           </a:p>
           <a:p>
             <a:r>
               <a:rPr lang="en-US" dirty="0"/>
-              <a:t>In that: it’s necessary to learn new vocab AND new grammar rules at the same time, otherwise it doesn’t make sense.  So be patient with yourselves, because it’s a stretch!</a:t>
+              <a:t>Today might be slow but we’re laying the foundation for charts &amp; modeling</a:t>
             </a:r>
           </a:p>
           <a:p>
-            <a:endParaRPr lang="en-US" dirty="0"/>
-          </a:p>
-          <a:p>
+            <a:pPr marL="0" marR="0" lvl="0" indent="0" algn="l" defTabSz="914400" rtl="0" eaLnBrk="1" fontAlgn="auto" latinLnBrk="0" hangingPunct="1">
+              <a:lnSpc>
+                <a:spcPct val="100000"/>
+              </a:lnSpc>
+              <a:spcBef>
+                <a:spcPts val="0"/>
+              </a:spcBef>
+              <a:spcAft>
+                <a:spcPts val="0"/>
+              </a:spcAft>
+              <a:buClrTx/>
+              <a:buSzTx/>
+              <a:buFontTx/>
+              <a:buNone/>
+              <a:tabLst/>
+              <a:defRPr/>
+            </a:pPr>
             <a:r>
               <a:rPr lang="en-US" dirty="0"/>
-              <a:t>Also, it’s really only possible with immersion, and it won’t REALLY make sense until you USE it.  </a:t>
+              <a:t>Not everyone needs to be an expert, but if you’re here, I want you to move up a level and at least be able to “read” R</a:t>
             </a:r>
-            <a:r>
-              <a:rPr lang="en-US"/>
-              <a:t>And ideally, when you use it on your OWN stuff!</a:t>
-            </a:r>
-          </a:p>
-          <a:p>
-            <a:endParaRPr lang="en-US"/>
           </a:p>
         </p:txBody>
       </p:sp>
@@ -1733,9 +1621,9 @@
           <a:bodyPr/>
           <a:lstStyle/>
           <a:p>
-            <a:fld id="{2D3618BD-5D63-447F-BEC2-3BD80D62BA09}" type="slidenum">
+            <a:fld id="{AD86E2D3-8F12-4CB7-B6F3-018CFC08298B}" type="slidenum">
               <a:rPr lang="en-US" smtClean="0"/>
-              <a:t>12</a:t>
+              <a:t>13</a:t>
             </a:fld>
             <a:endParaRPr lang="en-US"/>
           </a:p>
@@ -1744,7 +1632,7 @@
     </p:spTree>
     <p:extLst>
       <p:ext uri="{BB962C8B-B14F-4D97-AF65-F5344CB8AC3E}">
-        <p14:creationId xmlns:p14="http://schemas.microsoft.com/office/powerpoint/2010/main" val="443200328"/>
+        <p14:creationId xmlns:p14="http://schemas.microsoft.com/office/powerpoint/2010/main" val="2465146486"/>
       </p:ext>
     </p:extLst>
   </p:cSld>
@@ -1901,7 +1789,7 @@
           <a:p>
             <a:fld id="{9A69187F-33B1-48D6-A8D1-B3CDAB36B405}" type="datetimeFigureOut">
               <a:rPr lang="en-US" smtClean="0"/>
-              <a:t>12/11/2023</a:t>
+              <a:t>3/28/2025</a:t>
             </a:fld>
             <a:endParaRPr lang="en-US"/>
           </a:p>
@@ -2099,7 +1987,7 @@
           <a:p>
             <a:fld id="{9A69187F-33B1-48D6-A8D1-B3CDAB36B405}" type="datetimeFigureOut">
               <a:rPr lang="en-US" smtClean="0"/>
-              <a:t>12/11/2023</a:t>
+              <a:t>3/28/2025</a:t>
             </a:fld>
             <a:endParaRPr lang="en-US"/>
           </a:p>
@@ -2307,7 +2195,7 @@
           <a:p>
             <a:fld id="{9A69187F-33B1-48D6-A8D1-B3CDAB36B405}" type="datetimeFigureOut">
               <a:rPr lang="en-US" smtClean="0"/>
-              <a:t>12/11/2023</a:t>
+              <a:t>3/28/2025</a:t>
             </a:fld>
             <a:endParaRPr lang="en-US"/>
           </a:p>
@@ -2505,7 +2393,7 @@
           <a:p>
             <a:fld id="{9A69187F-33B1-48D6-A8D1-B3CDAB36B405}" type="datetimeFigureOut">
               <a:rPr lang="en-US" smtClean="0"/>
-              <a:t>12/11/2023</a:t>
+              <a:t>3/28/2025</a:t>
             </a:fld>
             <a:endParaRPr lang="en-US"/>
           </a:p>
@@ -2780,7 +2668,7 @@
           <a:p>
             <a:fld id="{9A69187F-33B1-48D6-A8D1-B3CDAB36B405}" type="datetimeFigureOut">
               <a:rPr lang="en-US" smtClean="0"/>
-              <a:t>12/11/2023</a:t>
+              <a:t>3/28/2025</a:t>
             </a:fld>
             <a:endParaRPr lang="en-US"/>
           </a:p>
@@ -3045,7 +2933,7 @@
           <a:p>
             <a:fld id="{9A69187F-33B1-48D6-A8D1-B3CDAB36B405}" type="datetimeFigureOut">
               <a:rPr lang="en-US" smtClean="0"/>
-              <a:t>12/11/2023</a:t>
+              <a:t>3/28/2025</a:t>
             </a:fld>
             <a:endParaRPr lang="en-US"/>
           </a:p>
@@ -3457,7 +3345,7 @@
           <a:p>
             <a:fld id="{9A69187F-33B1-48D6-A8D1-B3CDAB36B405}" type="datetimeFigureOut">
               <a:rPr lang="en-US" smtClean="0"/>
-              <a:t>12/11/2023</a:t>
+              <a:t>3/28/2025</a:t>
             </a:fld>
             <a:endParaRPr lang="en-US"/>
           </a:p>
@@ -3598,7 +3486,7 @@
           <a:p>
             <a:fld id="{9A69187F-33B1-48D6-A8D1-B3CDAB36B405}" type="datetimeFigureOut">
               <a:rPr lang="en-US" smtClean="0"/>
-              <a:t>12/11/2023</a:t>
+              <a:t>3/28/2025</a:t>
             </a:fld>
             <a:endParaRPr lang="en-US"/>
           </a:p>
@@ -3711,7 +3599,7 @@
           <a:p>
             <a:fld id="{9A69187F-33B1-48D6-A8D1-B3CDAB36B405}" type="datetimeFigureOut">
               <a:rPr lang="en-US" smtClean="0"/>
-              <a:t>12/11/2023</a:t>
+              <a:t>3/28/2025</a:t>
             </a:fld>
             <a:endParaRPr lang="en-US"/>
           </a:p>
@@ -4022,7 +3910,7 @@
           <a:p>
             <a:fld id="{9A69187F-33B1-48D6-A8D1-B3CDAB36B405}" type="datetimeFigureOut">
               <a:rPr lang="en-US" smtClean="0"/>
-              <a:t>12/11/2023</a:t>
+              <a:t>3/28/2025</a:t>
             </a:fld>
             <a:endParaRPr lang="en-US"/>
           </a:p>
@@ -4310,7 +4198,7 @@
           <a:p>
             <a:fld id="{9A69187F-33B1-48D6-A8D1-B3CDAB36B405}" type="datetimeFigureOut">
               <a:rPr lang="en-US" smtClean="0"/>
-              <a:t>12/11/2023</a:t>
+              <a:t>3/28/2025</a:t>
             </a:fld>
             <a:endParaRPr lang="en-US"/>
           </a:p>
@@ -4551,7 +4439,7 @@
           <a:p>
             <a:fld id="{9A69187F-33B1-48D6-A8D1-B3CDAB36B405}" type="datetimeFigureOut">
               <a:rPr lang="en-US" smtClean="0"/>
-              <a:t>12/11/2023</a:t>
+              <a:t>3/28/2025</a:t>
             </a:fld>
             <a:endParaRPr lang="en-US"/>
           </a:p>
@@ -5079,13 +4967,13 @@
           <a:p>
             <a:r>
               <a:rPr lang="en-US" sz="2000" dirty="0"/>
-              <a:t>December 12–13, 2023</a:t>
+              <a:t>April 16–18, 2025</a:t>
             </a:r>
           </a:p>
           <a:p>
             <a:r>
               <a:rPr lang="en-US" sz="2000" dirty="0"/>
-              <a:t>Matt Tyers &amp; Justin Priest</a:t>
+              <a:t>Logan Wendling &amp; Matt Tyers</a:t>
             </a:r>
           </a:p>
         </p:txBody>
@@ -5186,7 +5074,7 @@
         </p:spPr>
         <p:txBody>
           <a:bodyPr vert="horz" lIns="91440" tIns="45720" rIns="91440" bIns="45720" rtlCol="0">
-            <a:normAutofit fontScale="85000" lnSpcReduction="10000"/>
+            <a:normAutofit/>
           </a:bodyPr>
           <a:lstStyle>
             <a:lvl1pPr marL="0" indent="0" algn="ctr" defTabSz="914400" rtl="0" eaLnBrk="1" latinLnBrk="0" hangingPunct="1">
@@ -5355,7 +5243,7 @@
           <a:p>
             <a:r>
               <a:rPr lang="en-US" sz="2800" b="1" dirty="0"/>
-              <a:t>ADF&amp;G Workshop – Sport Fish RTS &amp; Comm Fish R1</a:t>
+              <a:t>ADF&amp;G Workshop</a:t>
             </a:r>
           </a:p>
         </p:txBody>
@@ -5374,96 +5262,6 @@
 </file>
 
 <file path=ppt/slides/slide10.xml><?xml version="1.0" encoding="utf-8"?>
-<p:sld xmlns:a="http://schemas.openxmlformats.org/drawingml/2006/main" xmlns:r="http://schemas.openxmlformats.org/officeDocument/2006/relationships" xmlns:p="http://schemas.openxmlformats.org/presentationml/2006/main">
-  <p:cSld>
-    <p:spTree>
-      <p:nvGrpSpPr>
-        <p:cNvPr id="1" name=""/>
-        <p:cNvGrpSpPr/>
-        <p:nvPr/>
-      </p:nvGrpSpPr>
-      <p:grpSpPr>
-        <a:xfrm>
-          <a:off x="0" y="0"/>
-          <a:ext cx="0" cy="0"/>
-          <a:chOff x="0" y="0"/>
-          <a:chExt cx="0" cy="0"/>
-        </a:xfrm>
-      </p:grpSpPr>
-      <p:sp>
-        <p:nvSpPr>
-          <p:cNvPr id="2" name="Title 1">
-            <a:extLst>
-              <a:ext uri="{FF2B5EF4-FFF2-40B4-BE49-F238E27FC236}">
-                <a16:creationId xmlns:a16="http://schemas.microsoft.com/office/drawing/2014/main" id="{ACD980A7-0204-9CD9-DCFC-61FE609FD2F7}"/>
-              </a:ext>
-            </a:extLst>
-          </p:cNvPr>
-          <p:cNvSpPr>
-            <a:spLocks noGrp="1"/>
-          </p:cNvSpPr>
-          <p:nvPr>
-            <p:ph type="title"/>
-          </p:nvPr>
-        </p:nvSpPr>
-        <p:spPr/>
-        <p:txBody>
-          <a:bodyPr/>
-          <a:lstStyle/>
-          <a:p>
-            <a:endParaRPr lang="en-US"/>
-          </a:p>
-        </p:txBody>
-      </p:sp>
-      <p:pic>
-        <p:nvPicPr>
-          <p:cNvPr id="5" name="Content Placeholder 4" descr="A cartoon character with a yellow background&#10;&#10;Description automatically generated">
-            <a:extLst>
-              <a:ext uri="{FF2B5EF4-FFF2-40B4-BE49-F238E27FC236}">
-                <a16:creationId xmlns:a16="http://schemas.microsoft.com/office/drawing/2014/main" id="{F9E65229-512E-C113-6DD1-939F9FBC6A1F}"/>
-              </a:ext>
-            </a:extLst>
-          </p:cNvPr>
-          <p:cNvPicPr>
-            <a:picLocks noGrp="1" noChangeAspect="1"/>
-          </p:cNvPicPr>
-          <p:nvPr>
-            <p:ph idx="1"/>
-          </p:nvPr>
-        </p:nvPicPr>
-        <p:blipFill>
-          <a:blip r:embed="rId3">
-            <a:extLst>
-              <a:ext uri="{28A0092B-C50C-407E-A947-70E740481C1C}">
-                <a14:useLocalDpi xmlns:a14="http://schemas.microsoft.com/office/drawing/2010/main" val="0"/>
-              </a:ext>
-            </a:extLst>
-          </a:blip>
-          <a:stretch>
-            <a:fillRect/>
-          </a:stretch>
-        </p:blipFill>
-        <p:spPr>
-          <a:xfrm>
-            <a:off x="2748817" y="1825625"/>
-            <a:ext cx="6694366" cy="4351338"/>
-          </a:xfrm>
-        </p:spPr>
-      </p:pic>
-    </p:spTree>
-    <p:extLst>
-      <p:ext uri="{BB962C8B-B14F-4D97-AF65-F5344CB8AC3E}">
-        <p14:creationId xmlns:p14="http://schemas.microsoft.com/office/powerpoint/2010/main" val="2635761389"/>
-      </p:ext>
-    </p:extLst>
-  </p:cSld>
-  <p:clrMapOvr>
-    <a:masterClrMapping/>
-  </p:clrMapOvr>
-</p:sld>
-</file>
-
-<file path=ppt/slides/slide11.xml><?xml version="1.0" encoding="utf-8"?>
 <p:sld xmlns:a="http://schemas.openxmlformats.org/drawingml/2006/main" xmlns:r="http://schemas.openxmlformats.org/officeDocument/2006/relationships" xmlns:p="http://schemas.openxmlformats.org/presentationml/2006/main">
   <p:cSld>
     <p:spTree>
@@ -6450,7 +6248,7 @@
 </p:sld>
 </file>
 
-<file path=ppt/slides/slide12.xml><?xml version="1.0" encoding="utf-8"?>
+<file path=ppt/slides/slide11.xml><?xml version="1.0" encoding="utf-8"?>
 <p:sld xmlns:a="http://schemas.openxmlformats.org/drawingml/2006/main" xmlns:r="http://schemas.openxmlformats.org/officeDocument/2006/relationships" xmlns:p="http://schemas.openxmlformats.org/presentationml/2006/main">
   <p:cSld>
     <p:spTree>
@@ -6592,7 +6390,7 @@
           <a:p>
             <a:fld id="{6D95AE55-B5F4-483D-AEFF-E8059F5502F5}" type="slidenum">
               <a:rPr lang="en-US" smtClean="0"/>
-              <a:t>12</a:t>
+              <a:t>11</a:t>
             </a:fld>
             <a:endParaRPr lang="en-US"/>
           </a:p>
@@ -8941,7 +8739,7 @@
 </p:sld>
 </file>
 
-<file path=ppt/slides/slide13.xml><?xml version="1.0" encoding="utf-8"?>
+<file path=ppt/slides/slide12.xml><?xml version="1.0" encoding="utf-8"?>
 <p:sld xmlns:a="http://schemas.openxmlformats.org/drawingml/2006/main" xmlns:r="http://schemas.openxmlformats.org/officeDocument/2006/relationships" xmlns:p="http://schemas.openxmlformats.org/presentationml/2006/main">
   <p:cSld>
     <p:spTree>
@@ -9073,7 +8871,7 @@
           <a:p>
             <a:fld id="{6D95AE55-B5F4-483D-AEFF-E8059F5502F5}" type="slidenum">
               <a:rPr lang="en-US" smtClean="0"/>
-              <a:t>13</a:t>
+              <a:t>12</a:t>
             </a:fld>
             <a:endParaRPr lang="en-US"/>
           </a:p>
@@ -11140,7 +10938,7 @@
 </p:sld>
 </file>
 
-<file path=ppt/slides/slide14.xml><?xml version="1.0" encoding="utf-8"?>
+<file path=ppt/slides/slide13.xml><?xml version="1.0" encoding="utf-8"?>
 <p:sld xmlns:a="http://schemas.openxmlformats.org/drawingml/2006/main" xmlns:r="http://schemas.openxmlformats.org/officeDocument/2006/relationships" xmlns:p="http://schemas.openxmlformats.org/presentationml/2006/main">
   <p:cSld>
     <p:spTree>
@@ -11294,7 +11092,7 @@
           <a:p>
             <a:fld id="{6D95AE55-B5F4-483D-AEFF-E8059F5502F5}" type="slidenum">
               <a:rPr lang="en-US" smtClean="0"/>
-              <a:t>14</a:t>
+              <a:t>13</a:t>
             </a:fld>
             <a:endParaRPr lang="en-US"/>
           </a:p>
@@ -11635,7 +11433,7 @@
 </p:sld>
 </file>
 
-<file path=ppt/slides/slide15.xml><?xml version="1.0" encoding="utf-8"?>
+<file path=ppt/slides/slide14.xml><?xml version="1.0" encoding="utf-8"?>
 <p:sld xmlns:a="http://schemas.openxmlformats.org/drawingml/2006/main" xmlns:r="http://schemas.openxmlformats.org/officeDocument/2006/relationships" xmlns:p="http://schemas.openxmlformats.org/presentationml/2006/main">
   <p:cSld>
     <p:spTree>
@@ -11798,7 +11596,7 @@
           <a:p>
             <a:fld id="{6D95AE55-B5F4-483D-AEFF-E8059F5502F5}" type="slidenum">
               <a:rPr lang="en-US" smtClean="0"/>
-              <a:t>15</a:t>
+              <a:t>14</a:t>
             </a:fld>
             <a:endParaRPr lang="en-US"/>
           </a:p>
@@ -11994,7 +11792,7 @@
 </p:sld>
 </file>
 
-<file path=ppt/slides/slide16.xml><?xml version="1.0" encoding="utf-8"?>
+<file path=ppt/slides/slide15.xml><?xml version="1.0" encoding="utf-8"?>
 <p:sld xmlns:a="http://schemas.openxmlformats.org/drawingml/2006/main" xmlns:r="http://schemas.openxmlformats.org/officeDocument/2006/relationships" xmlns:p="http://schemas.openxmlformats.org/presentationml/2006/main">
   <p:cSld>
     <p:spTree>
@@ -12157,7 +11955,7 @@
           <a:p>
             <a:fld id="{6D95AE55-B5F4-483D-AEFF-E8059F5502F5}" type="slidenum">
               <a:rPr lang="en-US" smtClean="0"/>
-              <a:t>16</a:t>
+              <a:t>15</a:t>
             </a:fld>
             <a:endParaRPr lang="en-US"/>
           </a:p>
@@ -12552,6 +12350,16 @@
             <a:r>
               <a:rPr lang="en-US" sz="2800" dirty="0"/>
               <a:t>HELP US KEEP THIS INTERACTIVE</a:t>
+            </a:r>
+          </a:p>
+          <a:p>
+            <a:pPr marL="342900" indent="-342900" algn="l">
+              <a:buFont typeface="Arial" panose="020B0604020202020204" pitchFamily="34" charset="0"/>
+              <a:buChar char="•"/>
+            </a:pPr>
+            <a:r>
+              <a:rPr lang="en-US" sz="2800" dirty="0"/>
+              <a:t>Turn on your camera if you feel comfortable doing so!</a:t>
             </a:r>
           </a:p>
           <a:p>
@@ -13304,7 +13112,7 @@
             </a:pPr>
             <a:r>
               <a:rPr lang="en-US" dirty="0"/>
-              <a:t>Anchorage – Jiaqi </a:t>
+              <a:t>Anchorage – Jiaqi Huang</a:t>
             </a:r>
           </a:p>
           <a:p>
@@ -13316,7 +13124,7 @@
             </a:pPr>
             <a:r>
               <a:rPr lang="en-US" dirty="0"/>
-              <a:t>Douglas – Randy</a:t>
+              <a:t>Douglas – Maya Chari</a:t>
             </a:r>
           </a:p>
           <a:p>
@@ -13328,20 +13136,13 @@
             </a:pPr>
             <a:r>
               <a:rPr lang="en-US" dirty="0"/>
-              <a:t>Fairbanks – Mackenzie </a:t>
+              <a:t>Kenai – Kyle </a:t>
             </a:r>
-          </a:p>
-          <a:p>
-            <a:pPr marL="0" indent="0">
-              <a:spcBef>
-                <a:spcPts val="2400"/>
-              </a:spcBef>
-              <a:buNone/>
-            </a:pPr>
             <a:r>
-              <a:rPr lang="en-US" dirty="0"/>
-              <a:t>Kodiak – Tyler</a:t>
+              <a:rPr lang="en-US" dirty="0" err="1"/>
+              <a:t>Gatt</a:t>
             </a:r>
+            <a:endParaRPr lang="en-US" dirty="0"/>
           </a:p>
           <a:p>
             <a:pPr marL="0" indent="0">
@@ -19331,7 +19132,7 @@
           <p:cNvPr id="2" name="Title 1">
             <a:extLst>
               <a:ext uri="{FF2B5EF4-FFF2-40B4-BE49-F238E27FC236}">
-                <a16:creationId xmlns:a16="http://schemas.microsoft.com/office/drawing/2014/main" id="{DAF12477-B04B-41CD-B187-DF3BDF1EC822}"/>
+                <a16:creationId xmlns:a16="http://schemas.microsoft.com/office/drawing/2014/main" id="{0C370A7A-A526-2581-AE54-6613A04AE8C3}"/>
               </a:ext>
             </a:extLst>
           </p:cNvPr>
@@ -19342,14 +19143,21 @@
             <p:ph type="title"/>
           </p:nvPr>
         </p:nvSpPr>
-        <p:spPr/>
+        <p:spPr>
+          <a:xfrm>
+            <a:off x="2285995" y="66896"/>
+            <a:ext cx="3501959" cy="662779"/>
+          </a:xfrm>
+        </p:spPr>
         <p:txBody>
-          <a:bodyPr/>
+          <a:bodyPr>
+            <a:normAutofit fontScale="90000"/>
+          </a:bodyPr>
           <a:lstStyle/>
           <a:p>
             <a:r>
               <a:rPr lang="en-US" dirty="0"/>
-              <a:t>Today’s Agenda</a:t>
+              <a:t>Our Roadmap</a:t>
             </a:r>
           </a:p>
         </p:txBody>
@@ -19359,7 +19167,7 @@
           <p:cNvPr id="3" name="Content Placeholder 2">
             <a:extLst>
               <a:ext uri="{FF2B5EF4-FFF2-40B4-BE49-F238E27FC236}">
-                <a16:creationId xmlns:a16="http://schemas.microsoft.com/office/drawing/2014/main" id="{D27CD436-6A5A-4189-AD98-3CF0D84DF993}"/>
+                <a16:creationId xmlns:a16="http://schemas.microsoft.com/office/drawing/2014/main" id="{86F5F207-364A-A436-3CB8-F83C8717AB10}"/>
               </a:ext>
             </a:extLst>
           </p:cNvPr>
@@ -19372,8 +19180,8 @@
         </p:nvSpPr>
         <p:spPr>
           <a:xfrm>
-            <a:off x="254128" y="1911446"/>
-            <a:ext cx="7908095" cy="3863712"/>
+            <a:off x="2618342" y="846305"/>
+            <a:ext cx="5757153" cy="4581726"/>
           </a:xfrm>
         </p:spPr>
         <p:txBody>
@@ -19386,7 +19194,7 @@
               <a:buNone/>
             </a:pPr>
             <a:r>
-              <a:rPr lang="en-US" i="1" dirty="0"/>
+              <a:rPr lang="en-US" sz="2400" dirty="0"/>
               <a:t>1 – Welcome!</a:t>
             </a:r>
           </a:p>
@@ -19395,8 +19203,8 @@
               <a:buNone/>
             </a:pPr>
             <a:r>
-              <a:rPr lang="en-US" i="1" dirty="0"/>
-              <a:t>2 – About R &amp; RStudio</a:t>
+              <a:rPr lang="en-US" sz="2400" dirty="0"/>
+              <a:t>2 – Introducing R &amp; RStudio</a:t>
             </a:r>
           </a:p>
           <a:p>
@@ -19404,8 +19212,8 @@
               <a:buNone/>
             </a:pPr>
             <a:r>
-              <a:rPr lang="en-US" i="1" dirty="0"/>
-              <a:t>3 – Programming basics, part I</a:t>
+              <a:rPr lang="en-US" sz="2400" dirty="0"/>
+              <a:t>3 – Programming basics, part 1</a:t>
             </a:r>
           </a:p>
           <a:p>
@@ -19413,8 +19221,8 @@
               <a:buNone/>
             </a:pPr>
             <a:r>
-              <a:rPr lang="en-US" i="1" dirty="0"/>
-              <a:t>   (Lunch)</a:t>
+              <a:rPr lang="en-US" sz="2400" dirty="0"/>
+              <a:t>4 – Programming basics, part 2</a:t>
             </a:r>
           </a:p>
           <a:p>
@@ -19422,8 +19230,8 @@
               <a:buNone/>
             </a:pPr>
             <a:r>
-              <a:rPr lang="en-US" i="1" dirty="0"/>
-              <a:t>4 – Programming basics, part II</a:t>
+              <a:rPr lang="en-US" sz="2400" dirty="0"/>
+              <a:t>5 – Reading (real!) data</a:t>
             </a:r>
           </a:p>
           <a:p>
@@ -19431,53 +19239,149 @@
               <a:buNone/>
             </a:pPr>
             <a:r>
-              <a:rPr lang="en-US" i="1" dirty="0"/>
-              <a:t>5 – Reading (real) data</a:t>
+              <a:rPr lang="en-US" sz="2400" dirty="0"/>
+              <a:t>6 – Data manipulation</a:t>
             </a:r>
           </a:p>
           <a:p>
             <a:pPr marL="0" indent="0">
               <a:buNone/>
             </a:pPr>
-            <a:endParaRPr lang="en-US" dirty="0"/>
+            <a:r>
+              <a:rPr lang="en-US" sz="2400" dirty="0"/>
+              <a:t>7 – Amazing plots and how to make them</a:t>
+            </a:r>
+          </a:p>
+          <a:p>
+            <a:pPr marL="0" indent="0">
+              <a:buNone/>
+            </a:pPr>
+            <a:r>
+              <a:rPr lang="en-US" sz="2400" dirty="0"/>
+              <a:t>8 – Intermediate/advanced/really cool topics</a:t>
+            </a:r>
+          </a:p>
+          <a:p>
+            <a:pPr marL="0" indent="0">
+              <a:buNone/>
+            </a:pPr>
+            <a:r>
+              <a:rPr lang="en-US" sz="2400" dirty="0"/>
+              <a:t>9 – Project!</a:t>
+            </a:r>
+          </a:p>
+          <a:p>
+            <a:pPr marL="0" indent="0">
+              <a:buNone/>
+            </a:pPr>
+            <a:r>
+              <a:rPr lang="en-US" sz="2400" dirty="0"/>
+              <a:t>10 – </a:t>
+            </a:r>
+            <a:r>
+              <a:rPr lang="en-US" sz="2400" dirty="0" err="1"/>
+              <a:t>Wrapup</a:t>
+            </a:r>
+            <a:r>
+              <a:rPr lang="en-US" sz="2400" dirty="0"/>
+              <a:t> &amp; what’s next?</a:t>
+            </a:r>
           </a:p>
         </p:txBody>
       </p:sp>
-      <p:sp>
-        <p:nvSpPr>
-          <p:cNvPr id="4" name="Slide Number Placeholder 3">
+      <p:pic>
+        <p:nvPicPr>
+          <p:cNvPr id="4" name="Picture 3">
             <a:extLst>
               <a:ext uri="{FF2B5EF4-FFF2-40B4-BE49-F238E27FC236}">
-                <a16:creationId xmlns:a16="http://schemas.microsoft.com/office/drawing/2014/main" id="{49340FDD-5A0B-47E3-8B31-24B773E77072}"/>
+                <a16:creationId xmlns:a16="http://schemas.microsoft.com/office/drawing/2014/main" id="{E3670FB7-026E-7656-8803-02F96198CB51}"/>
               </a:ext>
             </a:extLst>
           </p:cNvPr>
-          <p:cNvSpPr>
-            <a:spLocks noGrp="1"/>
-          </p:cNvSpPr>
-          <p:nvPr>
-            <p:ph type="sldNum" sz="quarter" idx="12"/>
-          </p:nvPr>
-        </p:nvSpPr>
-        <p:spPr/>
-        <p:txBody>
-          <a:bodyPr/>
-          <a:lstStyle/>
-          <a:p>
-            <a:fld id="{6D95AE55-B5F4-483D-AEFF-E8059F5502F5}" type="slidenum">
-              <a:rPr lang="en-US" smtClean="0"/>
-              <a:t>7</a:t>
-            </a:fld>
-            <a:endParaRPr lang="en-US"/>
-          </a:p>
-        </p:txBody>
-      </p:sp>
+          <p:cNvPicPr>
+            <a:picLocks noChangeAspect="1"/>
+          </p:cNvPicPr>
+          <p:nvPr/>
+        </p:nvPicPr>
+        <p:blipFill rotWithShape="1">
+          <a:blip r:embed="rId3"/>
+          <a:srcRect l="40088" t="23848" r="39028" b="25071"/>
+          <a:stretch/>
+        </p:blipFill>
+        <p:spPr>
+          <a:xfrm>
+            <a:off x="7989388" y="2626464"/>
+            <a:ext cx="519290" cy="1595336"/>
+          </a:xfrm>
+          <a:prstGeom prst="rect">
+            <a:avLst/>
+          </a:prstGeom>
+        </p:spPr>
+      </p:pic>
+      <p:pic>
+        <p:nvPicPr>
+          <p:cNvPr id="5" name="Picture 4">
+            <a:extLst>
+              <a:ext uri="{FF2B5EF4-FFF2-40B4-BE49-F238E27FC236}">
+                <a16:creationId xmlns:a16="http://schemas.microsoft.com/office/drawing/2014/main" id="{CFD833FC-79D1-FDA5-66EE-A807E49FEAA4}"/>
+              </a:ext>
+            </a:extLst>
+          </p:cNvPr>
+          <p:cNvPicPr>
+            <a:picLocks noChangeAspect="1"/>
+          </p:cNvPicPr>
+          <p:nvPr/>
+        </p:nvPicPr>
+        <p:blipFill rotWithShape="1">
+          <a:blip r:embed="rId3"/>
+          <a:srcRect l="40088" t="23848" r="39028" b="25071"/>
+          <a:stretch/>
+        </p:blipFill>
+        <p:spPr>
+          <a:xfrm rot="10800000">
+            <a:off x="2108793" y="505932"/>
+            <a:ext cx="519290" cy="2626367"/>
+          </a:xfrm>
+          <a:prstGeom prst="rect">
+            <a:avLst/>
+          </a:prstGeom>
+        </p:spPr>
+      </p:pic>
+      <p:pic>
+        <p:nvPicPr>
+          <p:cNvPr id="6" name="Picture 5">
+            <a:extLst>
+              <a:ext uri="{FF2B5EF4-FFF2-40B4-BE49-F238E27FC236}">
+                <a16:creationId xmlns:a16="http://schemas.microsoft.com/office/drawing/2014/main" id="{2A9FDBEE-07BE-01D4-8739-E8256039258E}"/>
+              </a:ext>
+            </a:extLst>
+          </p:cNvPr>
+          <p:cNvPicPr>
+            <a:picLocks noChangeAspect="1"/>
+          </p:cNvPicPr>
+          <p:nvPr/>
+        </p:nvPicPr>
+        <p:blipFill rotWithShape="1">
+          <a:blip r:embed="rId3"/>
+          <a:srcRect l="40088" t="23848" r="39028" b="25071"/>
+          <a:stretch/>
+        </p:blipFill>
+        <p:spPr>
+          <a:xfrm rot="10800000">
+            <a:off x="2099051" y="3804810"/>
+            <a:ext cx="519290" cy="1623220"/>
+          </a:xfrm>
+          <a:prstGeom prst="rect">
+            <a:avLst/>
+          </a:prstGeom>
+        </p:spPr>
+      </p:pic>
       <p:sp>
         <p:nvSpPr>
-          <p:cNvPr id="5" name="Content Placeholder 2">
+          <p:cNvPr id="7" name="Content Placeholder 2">
             <a:extLst>
               <a:ext uri="{FF2B5EF4-FFF2-40B4-BE49-F238E27FC236}">
-                <a16:creationId xmlns:a16="http://schemas.microsoft.com/office/drawing/2014/main" id="{DF555FAF-63CC-44A8-96D7-088CCCF93F08}"/>
+                <a16:creationId xmlns:a16="http://schemas.microsoft.com/office/drawing/2014/main" id="{BE8DFD5F-552E-98D7-0D54-B323292D8B11}"/>
               </a:ext>
             </a:extLst>
           </p:cNvPr>
@@ -19488,8 +19392,8 @@
         </p:nvSpPr>
         <p:spPr>
           <a:xfrm>
-            <a:off x="6982297" y="2356119"/>
-            <a:ext cx="5195454" cy="3127987"/>
+            <a:off x="301531" y="887744"/>
+            <a:ext cx="1867710" cy="1738720"/>
           </a:xfrm>
           <a:prstGeom prst="rect">
             <a:avLst/>
@@ -19664,421 +19568,60 @@
             </a:lvl9pPr>
           </a:lstStyle>
           <a:p>
+            <a:pPr marL="0" indent="0" algn="ctr">
+              <a:buFont typeface="Arial" panose="020B0604020202020204" pitchFamily="34" charset="0"/>
+              <a:buNone/>
+            </a:pPr>
+            <a:r>
+              <a:rPr lang="en-US" sz="2400" i="1" u="sng" dirty="0"/>
+              <a:t>Today:</a:t>
+            </a:r>
+          </a:p>
+          <a:p>
+            <a:pPr marL="0" indent="0" algn="ctr">
+              <a:buFont typeface="Arial" panose="020B0604020202020204" pitchFamily="34" charset="0"/>
+              <a:buNone/>
+            </a:pPr>
+            <a:r>
+              <a:rPr lang="en-US" sz="2000" dirty="0"/>
+              <a:t>All your</a:t>
+            </a:r>
+          </a:p>
+          <a:p>
+            <a:pPr marL="0" indent="0" algn="ctr">
+              <a:buFont typeface="Arial" panose="020B0604020202020204" pitchFamily="34" charset="0"/>
+              <a:buNone/>
+            </a:pPr>
+            <a:r>
+              <a:rPr lang="en-US" sz="2400" b="1" dirty="0"/>
+              <a:t>Base-R</a:t>
+            </a:r>
+          </a:p>
+          <a:p>
+            <a:pPr marL="0" indent="0" algn="ctr">
+              <a:buFont typeface="Arial" panose="020B0604020202020204" pitchFamily="34" charset="0"/>
+              <a:buNone/>
+            </a:pPr>
+            <a:r>
+              <a:rPr lang="en-US" sz="2000" dirty="0"/>
+              <a:t>belong to us</a:t>
+            </a:r>
+          </a:p>
+          <a:p>
             <a:pPr marL="0" indent="0">
               <a:buFont typeface="Arial" panose="020B0604020202020204" pitchFamily="34" charset="0"/>
               <a:buNone/>
             </a:pPr>
-            <a:r>
-              <a:rPr lang="en-US" b="1" dirty="0"/>
-              <a:t>Each section will be organized by:</a:t>
-            </a:r>
-          </a:p>
-          <a:p>
-            <a:pPr marL="0" indent="0">
-              <a:buNone/>
-            </a:pPr>
-            <a:r>
-              <a:rPr lang="en-US" dirty="0"/>
-              <a:t>~30 min PowerPoint</a:t>
-            </a:r>
-          </a:p>
-          <a:p>
-            <a:pPr marL="0" indent="0">
-              <a:buFont typeface="Arial" panose="020B0604020202020204" pitchFamily="34" charset="0"/>
-              <a:buNone/>
-            </a:pPr>
-            <a:r>
-              <a:rPr lang="en-US" dirty="0"/>
-              <a:t>~20–30 min RStudio demo</a:t>
-            </a:r>
-          </a:p>
-          <a:p>
-            <a:pPr marL="0" indent="0">
-              <a:buNone/>
-            </a:pPr>
-            <a:r>
-              <a:rPr lang="en-US" dirty="0"/>
-              <a:t>~10–20 min “</a:t>
-            </a:r>
-            <a:r>
-              <a:rPr lang="en-US" dirty="0" err="1"/>
-              <a:t>learnr</a:t>
-            </a:r>
-            <a:r>
-              <a:rPr lang="en-US" dirty="0"/>
-              <a:t>” code practice</a:t>
-            </a:r>
-          </a:p>
-          <a:p>
-            <a:pPr marL="0" indent="0">
-              <a:buNone/>
-            </a:pPr>
-            <a:endParaRPr lang="en-US" sz="1200" i="1" dirty="0"/>
-          </a:p>
-          <a:p>
-            <a:pPr marL="0" indent="0">
-              <a:buNone/>
-            </a:pPr>
-            <a:r>
-              <a:rPr lang="en-US" sz="2000" i="1" dirty="0"/>
-              <a:t>Some </a:t>
-            </a:r>
-            <a:r>
-              <a:rPr lang="en-US" sz="2000" i="1" dirty="0" err="1"/>
-              <a:t>learnr</a:t>
-            </a:r>
-            <a:r>
-              <a:rPr lang="en-US" sz="2000" i="1" dirty="0"/>
-              <a:t> tutorials will not be able to be completed on time; that’s ok! Finish later</a:t>
-            </a:r>
-            <a:endParaRPr lang="en-US" sz="2400" i="1" dirty="0"/>
-          </a:p>
-          <a:p>
-            <a:pPr marL="0" indent="0">
-              <a:buFont typeface="Arial" panose="020B0604020202020204" pitchFamily="34" charset="0"/>
-              <a:buNone/>
-            </a:pPr>
-            <a:endParaRPr lang="en-US" dirty="0"/>
-          </a:p>
-        </p:txBody>
-      </p:sp>
-      <p:pic>
-        <p:nvPicPr>
-          <p:cNvPr id="8" name="Picture 7">
-            <a:extLst>
-              <a:ext uri="{FF2B5EF4-FFF2-40B4-BE49-F238E27FC236}">
-                <a16:creationId xmlns:a16="http://schemas.microsoft.com/office/drawing/2014/main" id="{2D53D035-60BA-41F9-B1AF-8278F40622D8}"/>
-              </a:ext>
-            </a:extLst>
-          </p:cNvPr>
-          <p:cNvPicPr>
-            <a:picLocks noChangeAspect="1"/>
-          </p:cNvPicPr>
-          <p:nvPr/>
-        </p:nvPicPr>
-        <p:blipFill rotWithShape="1">
-          <a:blip r:embed="rId3"/>
-          <a:srcRect l="40088" t="23848" r="39028" b="25071"/>
-          <a:stretch/>
-        </p:blipFill>
-        <p:spPr>
-          <a:xfrm>
-            <a:off x="6311890" y="1864478"/>
-            <a:ext cx="519290" cy="4209063"/>
-          </a:xfrm>
-          <a:prstGeom prst="rect">
-            <a:avLst/>
-          </a:prstGeom>
-        </p:spPr>
-      </p:pic>
-    </p:spTree>
-    <p:extLst>
-      <p:ext uri="{BB962C8B-B14F-4D97-AF65-F5344CB8AC3E}">
-        <p14:creationId xmlns:p14="http://schemas.microsoft.com/office/powerpoint/2010/main" val="28313102"/>
-      </p:ext>
-    </p:extLst>
-  </p:cSld>
-  <p:clrMapOvr>
-    <a:masterClrMapping/>
-  </p:clrMapOvr>
-  <p:timing>
-    <p:tnLst>
-      <p:par>
-        <p:cTn id="1" dur="indefinite" restart="never" nodeType="tmRoot">
-          <p:childTnLst>
-            <p:seq concurrent="1" nextAc="seek">
-              <p:cTn id="2" dur="indefinite" nodeType="mainSeq">
-                <p:childTnLst>
-                  <p:par>
-                    <p:cTn id="3" fill="hold">
-                      <p:stCondLst>
-                        <p:cond delay="indefinite"/>
-                      </p:stCondLst>
-                      <p:childTnLst>
-                        <p:par>
-                          <p:cTn id="4" fill="hold">
-                            <p:stCondLst>
-                              <p:cond delay="0"/>
-                            </p:stCondLst>
-                            <p:childTnLst>
-                              <p:par>
-                                <p:cTn id="5" presetID="1" presetClass="entr" presetSubtype="0" fill="hold" nodeType="clickEffect">
-                                  <p:stCondLst>
-                                    <p:cond delay="0"/>
-                                  </p:stCondLst>
-                                  <p:childTnLst>
-                                    <p:set>
-                                      <p:cBhvr>
-                                        <p:cTn id="6" dur="1" fill="hold">
-                                          <p:stCondLst>
-                                            <p:cond delay="0"/>
-                                          </p:stCondLst>
-                                        </p:cTn>
-                                        <p:tgtEl>
-                                          <p:spTgt spid="8"/>
-                                        </p:tgtEl>
-                                        <p:attrNameLst>
-                                          <p:attrName>style.visibility</p:attrName>
-                                        </p:attrNameLst>
-                                      </p:cBhvr>
-                                      <p:to>
-                                        <p:strVal val="visible"/>
-                                      </p:to>
-                                    </p:set>
-                                  </p:childTnLst>
-                                </p:cTn>
-                              </p:par>
-                              <p:par>
-                                <p:cTn id="7" presetID="1" presetClass="entr" presetSubtype="0" fill="hold" grpId="0" nodeType="withEffect">
-                                  <p:stCondLst>
-                                    <p:cond delay="0"/>
-                                  </p:stCondLst>
-                                  <p:childTnLst>
-                                    <p:set>
-                                      <p:cBhvr>
-                                        <p:cTn id="8" dur="1" fill="hold">
-                                          <p:stCondLst>
-                                            <p:cond delay="0"/>
-                                          </p:stCondLst>
-                                        </p:cTn>
-                                        <p:tgtEl>
-                                          <p:spTgt spid="5"/>
-                                        </p:tgtEl>
-                                        <p:attrNameLst>
-                                          <p:attrName>style.visibility</p:attrName>
-                                        </p:attrNameLst>
-                                      </p:cBhvr>
-                                      <p:to>
-                                        <p:strVal val="visible"/>
-                                      </p:to>
-                                    </p:set>
-                                  </p:childTnLst>
-                                </p:cTn>
-                              </p:par>
-                            </p:childTnLst>
-                          </p:cTn>
-                        </p:par>
-                      </p:childTnLst>
-                    </p:cTn>
-                  </p:par>
-                </p:childTnLst>
-              </p:cTn>
-              <p:prevCondLst>
-                <p:cond evt="onPrev" delay="0">
-                  <p:tgtEl>
-                    <p:sldTgt/>
-                  </p:tgtEl>
-                </p:cond>
-              </p:prevCondLst>
-              <p:nextCondLst>
-                <p:cond evt="onNext" delay="0">
-                  <p:tgtEl>
-                    <p:sldTgt/>
-                  </p:tgtEl>
-                </p:cond>
-              </p:nextCondLst>
-            </p:seq>
-          </p:childTnLst>
-        </p:cTn>
-      </p:par>
-    </p:tnLst>
-    <p:bldLst>
-      <p:bldP spid="5" grpId="0"/>
-    </p:bldLst>
-  </p:timing>
-</p:sld>
-</file>
-
-<file path=ppt/slides/slide8.xml><?xml version="1.0" encoding="utf-8"?>
-<p:sld xmlns:a="http://schemas.openxmlformats.org/drawingml/2006/main" xmlns:r="http://schemas.openxmlformats.org/officeDocument/2006/relationships" xmlns:p="http://schemas.openxmlformats.org/presentationml/2006/main">
-  <p:cSld>
-    <p:spTree>
-      <p:nvGrpSpPr>
-        <p:cNvPr id="1" name=""/>
-        <p:cNvGrpSpPr/>
-        <p:nvPr/>
-      </p:nvGrpSpPr>
-      <p:grpSpPr>
-        <a:xfrm>
-          <a:off x="0" y="0"/>
-          <a:ext cx="0" cy="0"/>
-          <a:chOff x="0" y="0"/>
-          <a:chExt cx="0" cy="0"/>
-        </a:xfrm>
-      </p:grpSpPr>
-      <p:sp>
-        <p:nvSpPr>
-          <p:cNvPr id="2" name="Title 1">
-            <a:extLst>
-              <a:ext uri="{FF2B5EF4-FFF2-40B4-BE49-F238E27FC236}">
-                <a16:creationId xmlns:a16="http://schemas.microsoft.com/office/drawing/2014/main" id="{AA29A1FB-D159-4FD1-8F86-72EFE5A1C7E7}"/>
-              </a:ext>
-            </a:extLst>
-          </p:cNvPr>
-          <p:cNvSpPr>
-            <a:spLocks noGrp="1"/>
-          </p:cNvSpPr>
-          <p:nvPr>
-            <p:ph type="title"/>
-          </p:nvPr>
-        </p:nvSpPr>
-        <p:spPr/>
-        <p:txBody>
-          <a:bodyPr/>
-          <a:lstStyle/>
-          <a:p>
-            <a:r>
-              <a:rPr lang="en-US" dirty="0"/>
-              <a:t>Tomorrow…</a:t>
-            </a:r>
+            <a:endParaRPr lang="en-US" sz="2400" dirty="0"/>
           </a:p>
         </p:txBody>
       </p:sp>
       <p:sp>
         <p:nvSpPr>
-          <p:cNvPr id="4" name="Slide Number Placeholder 3">
+          <p:cNvPr id="8" name="Content Placeholder 2">
             <a:extLst>
               <a:ext uri="{FF2B5EF4-FFF2-40B4-BE49-F238E27FC236}">
-                <a16:creationId xmlns:a16="http://schemas.microsoft.com/office/drawing/2014/main" id="{C0870503-D512-448F-8F00-BB844688BDC8}"/>
-              </a:ext>
-            </a:extLst>
-          </p:cNvPr>
-          <p:cNvSpPr>
-            <a:spLocks noGrp="1"/>
-          </p:cNvSpPr>
-          <p:nvPr>
-            <p:ph type="sldNum" sz="quarter" idx="12"/>
-          </p:nvPr>
-        </p:nvSpPr>
-        <p:spPr/>
-        <p:txBody>
-          <a:bodyPr/>
-          <a:lstStyle/>
-          <a:p>
-            <a:fld id="{6D95AE55-B5F4-483D-AEFF-E8059F5502F5}" type="slidenum">
-              <a:rPr lang="en-US" smtClean="0"/>
-              <a:t>8</a:t>
-            </a:fld>
-            <a:endParaRPr lang="en-US"/>
-          </a:p>
-        </p:txBody>
-      </p:sp>
-      <p:sp>
-        <p:nvSpPr>
-          <p:cNvPr id="5" name="Content Placeholder 2">
-            <a:extLst>
-              <a:ext uri="{FF2B5EF4-FFF2-40B4-BE49-F238E27FC236}">
-                <a16:creationId xmlns:a16="http://schemas.microsoft.com/office/drawing/2014/main" id="{74186E8D-D29C-40D4-9691-CBCE1B892EC9}"/>
-              </a:ext>
-            </a:extLst>
-          </p:cNvPr>
-          <p:cNvSpPr>
-            <a:spLocks noGrp="1"/>
-          </p:cNvSpPr>
-          <p:nvPr>
-            <p:ph idx="1"/>
-          </p:nvPr>
-        </p:nvSpPr>
-        <p:spPr>
-          <a:xfrm>
-            <a:off x="838200" y="1825625"/>
-            <a:ext cx="7603156" cy="3998819"/>
-          </a:xfrm>
-        </p:spPr>
-        <p:txBody>
-          <a:bodyPr>
-            <a:normAutofit lnSpcReduction="10000"/>
-          </a:bodyPr>
-          <a:lstStyle/>
-          <a:p>
-            <a:pPr marL="0" indent="0">
-              <a:buNone/>
-            </a:pPr>
-            <a:r>
-              <a:rPr lang="en-US" i="1" dirty="0"/>
-              <a:t>   (Welcome back &amp; review)</a:t>
-            </a:r>
-          </a:p>
-          <a:p>
-            <a:pPr marL="0" indent="0">
-              <a:buNone/>
-            </a:pPr>
-            <a:r>
-              <a:rPr lang="en-US" i="1" dirty="0"/>
-              <a:t>6 – Data Manipulation</a:t>
-            </a:r>
-          </a:p>
-          <a:p>
-            <a:pPr marL="0" indent="0">
-              <a:buNone/>
-            </a:pPr>
-            <a:r>
-              <a:rPr lang="en-US" i="1" dirty="0"/>
-              <a:t>7.1 – Amazing charts &amp; how to make them I</a:t>
-            </a:r>
-          </a:p>
-          <a:p>
-            <a:pPr marL="0" indent="0">
-              <a:buNone/>
-            </a:pPr>
-            <a:r>
-              <a:rPr lang="en-US" i="1" dirty="0"/>
-              <a:t>   (Lunch)</a:t>
-            </a:r>
-          </a:p>
-          <a:p>
-            <a:pPr marL="0" indent="0">
-              <a:buNone/>
-            </a:pPr>
-            <a:r>
-              <a:rPr lang="en-US" i="1" dirty="0"/>
-              <a:t>7.2 – Amazing charts &amp; how to make them II</a:t>
-            </a:r>
-          </a:p>
-          <a:p>
-            <a:pPr marL="0" indent="0">
-              <a:buNone/>
-            </a:pPr>
-            <a:r>
-              <a:rPr lang="en-US" i="1" dirty="0"/>
-              <a:t>8 – Intermediate/Advanced topics</a:t>
-            </a:r>
-          </a:p>
-          <a:p>
-            <a:pPr marL="0" indent="0">
-              <a:buNone/>
-            </a:pPr>
-            <a:r>
-              <a:rPr lang="en-US" i="1" dirty="0"/>
-              <a:t>9 – Project!</a:t>
-            </a:r>
-          </a:p>
-          <a:p>
-            <a:pPr marL="0" indent="0">
-              <a:buNone/>
-            </a:pPr>
-            <a:r>
-              <a:rPr lang="en-US" i="1" dirty="0"/>
-              <a:t>10 – </a:t>
-            </a:r>
-            <a:r>
-              <a:rPr lang="en-US" i="1" dirty="0" err="1"/>
-              <a:t>Wrapup</a:t>
-            </a:r>
-            <a:r>
-              <a:rPr lang="en-US" i="1" dirty="0"/>
-              <a:t> &amp; what’s next?</a:t>
-            </a:r>
-            <a:endParaRPr lang="en-US" dirty="0"/>
-          </a:p>
-        </p:txBody>
-      </p:sp>
-      <p:sp>
-        <p:nvSpPr>
-          <p:cNvPr id="6" name="Content Placeholder 2">
-            <a:extLst>
-              <a:ext uri="{FF2B5EF4-FFF2-40B4-BE49-F238E27FC236}">
-                <a16:creationId xmlns:a16="http://schemas.microsoft.com/office/drawing/2014/main" id="{37E735ED-C601-4F18-9F8E-6A85158565DE}"/>
+                <a16:creationId xmlns:a16="http://schemas.microsoft.com/office/drawing/2014/main" id="{052DA23A-1B73-F102-2288-CF7BF783666B}"/>
               </a:ext>
             </a:extLst>
           </p:cNvPr>
@@ -20089,8 +19632,8 @@
         </p:nvSpPr>
         <p:spPr>
           <a:xfrm>
-            <a:off x="7757961" y="925479"/>
-            <a:ext cx="4093433" cy="2385611"/>
+            <a:off x="8489208" y="2626463"/>
+            <a:ext cx="1867710" cy="1366736"/>
           </a:xfrm>
           <a:prstGeom prst="rect">
             <a:avLst/>
@@ -20270,35 +19813,39 @@
               <a:buNone/>
             </a:pPr>
             <a:r>
-              <a:rPr lang="en-US" sz="2400" b="1" dirty="0"/>
-              <a:t>Project!</a:t>
+              <a:rPr lang="en-US" sz="2400" i="1" u="sng" dirty="0"/>
+              <a:t>Tomorrow:</a:t>
             </a:r>
           </a:p>
           <a:p>
-            <a:pPr marL="0" indent="0">
+            <a:pPr marL="0" indent="0" algn="ctr">
               <a:buFont typeface="Arial" panose="020B0604020202020204" pitchFamily="34" charset="0"/>
               <a:buNone/>
             </a:pPr>
             <a:r>
-              <a:rPr lang="en-US" sz="2400" dirty="0"/>
-              <a:t>Throughout today, think of a project that you’ll work on tomorrow, especially whether any issues we’ll discuss pertain to your dataset. </a:t>
+              <a:rPr lang="en-US" sz="2000" dirty="0"/>
+              <a:t>Enter the</a:t>
             </a:r>
           </a:p>
           <a:p>
-            <a:pPr marL="0" indent="0">
+            <a:pPr marL="0" indent="0" algn="ctr">
               <a:buFont typeface="Arial" panose="020B0604020202020204" pitchFamily="34" charset="0"/>
               <a:buNone/>
             </a:pPr>
+            <a:r>
+              <a:rPr lang="en-US" sz="2400" b="1" dirty="0" err="1"/>
+              <a:t>Tidyverse</a:t>
+            </a:r>
             <a:endParaRPr lang="en-US" sz="2400" dirty="0"/>
           </a:p>
         </p:txBody>
       </p:sp>
       <p:sp>
         <p:nvSpPr>
-          <p:cNvPr id="7" name="Content Placeholder 2">
+          <p:cNvPr id="9" name="Content Placeholder 2">
             <a:extLst>
               <a:ext uri="{FF2B5EF4-FFF2-40B4-BE49-F238E27FC236}">
-                <a16:creationId xmlns:a16="http://schemas.microsoft.com/office/drawing/2014/main" id="{BCAE72D0-4B4B-45F1-8EC5-498A7F3ADCD9}"/>
+                <a16:creationId xmlns:a16="http://schemas.microsoft.com/office/drawing/2014/main" id="{BC91478E-9DCB-4ABF-1A4D-CD651405C333}"/>
               </a:ext>
             </a:extLst>
           </p:cNvPr>
@@ -20309,8 +19856,8 @@
         </p:nvSpPr>
         <p:spPr>
           <a:xfrm>
-            <a:off x="3721" y="5824444"/>
-            <a:ext cx="12192001" cy="714468"/>
+            <a:off x="770102" y="4148841"/>
+            <a:ext cx="1264315" cy="1347282"/>
           </a:xfrm>
           <a:prstGeom prst="rect">
             <a:avLst/>
@@ -20490,16 +20037,511 @@
               <a:buNone/>
             </a:pPr>
             <a:r>
+              <a:rPr lang="en-US" sz="2400" i="1" u="sng" dirty="0"/>
+              <a:t>Friday:</a:t>
+            </a:r>
+          </a:p>
+          <a:p>
+            <a:pPr marL="0" indent="0" algn="ctr">
+              <a:buFont typeface="Arial" panose="020B0604020202020204" pitchFamily="34" charset="0"/>
+              <a:buNone/>
+            </a:pPr>
+            <a:r>
+              <a:rPr lang="en-US" sz="2000" dirty="0"/>
+              <a:t>The</a:t>
+            </a:r>
+          </a:p>
+          <a:p>
+            <a:pPr marL="0" indent="0" algn="ctr">
+              <a:buFont typeface="Arial" panose="020B0604020202020204" pitchFamily="34" charset="0"/>
+              <a:buNone/>
+            </a:pPr>
+            <a:r>
+              <a:rPr lang="en-US" sz="2400" b="1" dirty="0"/>
+              <a:t>fun stuff</a:t>
+            </a:r>
+            <a:endParaRPr lang="en-US" sz="2400" dirty="0"/>
+          </a:p>
+        </p:txBody>
+      </p:sp>
+      <p:sp>
+        <p:nvSpPr>
+          <p:cNvPr id="11" name="Content Placeholder 2">
+            <a:extLst>
+              <a:ext uri="{FF2B5EF4-FFF2-40B4-BE49-F238E27FC236}">
+                <a16:creationId xmlns:a16="http://schemas.microsoft.com/office/drawing/2014/main" id="{F62C0C00-C912-884F-EED8-39A3A1DD94BF}"/>
+              </a:ext>
+            </a:extLst>
+          </p:cNvPr>
+          <p:cNvSpPr txBox="1">
+            <a:spLocks/>
+          </p:cNvSpPr>
+          <p:nvPr/>
+        </p:nvSpPr>
+        <p:spPr>
+          <a:xfrm>
+            <a:off x="7740190" y="102146"/>
+            <a:ext cx="4324967" cy="2264930"/>
+          </a:xfrm>
+          <a:prstGeom prst="rect">
+            <a:avLst/>
+          </a:prstGeom>
+          <a:ln>
+            <a:solidFill>
+              <a:schemeClr val="tx1"/>
+            </a:solidFill>
+          </a:ln>
+        </p:spPr>
+        <p:txBody>
+          <a:bodyPr vert="horz" lIns="91440" tIns="45720" rIns="91440" bIns="45720" rtlCol="0">
+            <a:normAutofit/>
+          </a:bodyPr>
+          <a:lstStyle>
+            <a:lvl1pPr marL="228600" indent="-228600" algn="l" defTabSz="914400" rtl="0" eaLnBrk="1" latinLnBrk="0" hangingPunct="1">
+              <a:lnSpc>
+                <a:spcPct val="90000"/>
+              </a:lnSpc>
+              <a:spcBef>
+                <a:spcPts val="1000"/>
+              </a:spcBef>
+              <a:buFont typeface="Arial" panose="020B0604020202020204" pitchFamily="34" charset="0"/>
+              <a:buChar char="•"/>
+              <a:defRPr sz="2800" kern="1200">
+                <a:solidFill>
+                  <a:schemeClr val="tx1"/>
+                </a:solidFill>
+                <a:latin typeface="+mn-lt"/>
+                <a:ea typeface="+mn-ea"/>
+                <a:cs typeface="+mn-cs"/>
+              </a:defRPr>
+            </a:lvl1pPr>
+            <a:lvl2pPr marL="685800" indent="-228600" algn="l" defTabSz="914400" rtl="0" eaLnBrk="1" latinLnBrk="0" hangingPunct="1">
+              <a:lnSpc>
+                <a:spcPct val="90000"/>
+              </a:lnSpc>
+              <a:spcBef>
+                <a:spcPts val="500"/>
+              </a:spcBef>
+              <a:buFont typeface="Arial" panose="020B0604020202020204" pitchFamily="34" charset="0"/>
+              <a:buChar char="•"/>
+              <a:defRPr sz="2400" kern="1200">
+                <a:solidFill>
+                  <a:schemeClr val="tx1"/>
+                </a:solidFill>
+                <a:latin typeface="+mn-lt"/>
+                <a:ea typeface="+mn-ea"/>
+                <a:cs typeface="+mn-cs"/>
+              </a:defRPr>
+            </a:lvl2pPr>
+            <a:lvl3pPr marL="1143000" indent="-228600" algn="l" defTabSz="914400" rtl="0" eaLnBrk="1" latinLnBrk="0" hangingPunct="1">
+              <a:lnSpc>
+                <a:spcPct val="90000"/>
+              </a:lnSpc>
+              <a:spcBef>
+                <a:spcPts val="500"/>
+              </a:spcBef>
+              <a:buFont typeface="Arial" panose="020B0604020202020204" pitchFamily="34" charset="0"/>
+              <a:buChar char="•"/>
+              <a:defRPr sz="2000" kern="1200">
+                <a:solidFill>
+                  <a:schemeClr val="tx1"/>
+                </a:solidFill>
+                <a:latin typeface="+mn-lt"/>
+                <a:ea typeface="+mn-ea"/>
+                <a:cs typeface="+mn-cs"/>
+              </a:defRPr>
+            </a:lvl3pPr>
+            <a:lvl4pPr marL="1600200" indent="-228600" algn="l" defTabSz="914400" rtl="0" eaLnBrk="1" latinLnBrk="0" hangingPunct="1">
+              <a:lnSpc>
+                <a:spcPct val="90000"/>
+              </a:lnSpc>
+              <a:spcBef>
+                <a:spcPts val="500"/>
+              </a:spcBef>
+              <a:buFont typeface="Arial" panose="020B0604020202020204" pitchFamily="34" charset="0"/>
+              <a:buChar char="•"/>
+              <a:defRPr sz="1800" kern="1200">
+                <a:solidFill>
+                  <a:schemeClr val="tx1"/>
+                </a:solidFill>
+                <a:latin typeface="+mn-lt"/>
+                <a:ea typeface="+mn-ea"/>
+                <a:cs typeface="+mn-cs"/>
+              </a:defRPr>
+            </a:lvl4pPr>
+            <a:lvl5pPr marL="2057400" indent="-228600" algn="l" defTabSz="914400" rtl="0" eaLnBrk="1" latinLnBrk="0" hangingPunct="1">
+              <a:lnSpc>
+                <a:spcPct val="90000"/>
+              </a:lnSpc>
+              <a:spcBef>
+                <a:spcPts val="500"/>
+              </a:spcBef>
+              <a:buFont typeface="Arial" panose="020B0604020202020204" pitchFamily="34" charset="0"/>
+              <a:buChar char="•"/>
+              <a:defRPr sz="1800" kern="1200">
+                <a:solidFill>
+                  <a:schemeClr val="tx1"/>
+                </a:solidFill>
+                <a:latin typeface="+mn-lt"/>
+                <a:ea typeface="+mn-ea"/>
+                <a:cs typeface="+mn-cs"/>
+              </a:defRPr>
+            </a:lvl5pPr>
+            <a:lvl6pPr marL="2514600" indent="-228600" algn="l" defTabSz="914400" rtl="0" eaLnBrk="1" latinLnBrk="0" hangingPunct="1">
+              <a:lnSpc>
+                <a:spcPct val="90000"/>
+              </a:lnSpc>
+              <a:spcBef>
+                <a:spcPts val="500"/>
+              </a:spcBef>
+              <a:buFont typeface="Arial" panose="020B0604020202020204" pitchFamily="34" charset="0"/>
+              <a:buChar char="•"/>
+              <a:defRPr sz="1800" kern="1200">
+                <a:solidFill>
+                  <a:schemeClr val="tx1"/>
+                </a:solidFill>
+                <a:latin typeface="+mn-lt"/>
+                <a:ea typeface="+mn-ea"/>
+                <a:cs typeface="+mn-cs"/>
+              </a:defRPr>
+            </a:lvl6pPr>
+            <a:lvl7pPr marL="2971800" indent="-228600" algn="l" defTabSz="914400" rtl="0" eaLnBrk="1" latinLnBrk="0" hangingPunct="1">
+              <a:lnSpc>
+                <a:spcPct val="90000"/>
+              </a:lnSpc>
+              <a:spcBef>
+                <a:spcPts val="500"/>
+              </a:spcBef>
+              <a:buFont typeface="Arial" panose="020B0604020202020204" pitchFamily="34" charset="0"/>
+              <a:buChar char="•"/>
+              <a:defRPr sz="1800" kern="1200">
+                <a:solidFill>
+                  <a:schemeClr val="tx1"/>
+                </a:solidFill>
+                <a:latin typeface="+mn-lt"/>
+                <a:ea typeface="+mn-ea"/>
+                <a:cs typeface="+mn-cs"/>
+              </a:defRPr>
+            </a:lvl7pPr>
+            <a:lvl8pPr marL="3429000" indent="-228600" algn="l" defTabSz="914400" rtl="0" eaLnBrk="1" latinLnBrk="0" hangingPunct="1">
+              <a:lnSpc>
+                <a:spcPct val="90000"/>
+              </a:lnSpc>
+              <a:spcBef>
+                <a:spcPts val="500"/>
+              </a:spcBef>
+              <a:buFont typeface="Arial" panose="020B0604020202020204" pitchFamily="34" charset="0"/>
+              <a:buChar char="•"/>
+              <a:defRPr sz="1800" kern="1200">
+                <a:solidFill>
+                  <a:schemeClr val="tx1"/>
+                </a:solidFill>
+                <a:latin typeface="+mn-lt"/>
+                <a:ea typeface="+mn-ea"/>
+                <a:cs typeface="+mn-cs"/>
+              </a:defRPr>
+            </a:lvl8pPr>
+            <a:lvl9pPr marL="3886200" indent="-228600" algn="l" defTabSz="914400" rtl="0" eaLnBrk="1" latinLnBrk="0" hangingPunct="1">
+              <a:lnSpc>
+                <a:spcPct val="90000"/>
+              </a:lnSpc>
+              <a:spcBef>
+                <a:spcPts val="500"/>
+              </a:spcBef>
+              <a:buFont typeface="Arial" panose="020B0604020202020204" pitchFamily="34" charset="0"/>
+              <a:buChar char="•"/>
+              <a:defRPr sz="1800" kern="1200">
+                <a:solidFill>
+                  <a:schemeClr val="tx1"/>
+                </a:solidFill>
+                <a:latin typeface="+mn-lt"/>
+                <a:ea typeface="+mn-ea"/>
+                <a:cs typeface="+mn-cs"/>
+              </a:defRPr>
+            </a:lvl9pPr>
+          </a:lstStyle>
+          <a:p>
+            <a:pPr marL="0" indent="0">
+              <a:buFont typeface="Arial" panose="020B0604020202020204" pitchFamily="34" charset="0"/>
+              <a:buNone/>
+            </a:pPr>
+            <a:r>
               <a:rPr lang="en-US" sz="2400" i="1" dirty="0"/>
-              <a:t>Today will be a little dry but tomorrow will be very visual!</a:t>
+              <a:t>Most sections will have:</a:t>
             </a:r>
+          </a:p>
+          <a:p>
+            <a:r>
+              <a:rPr lang="en-US" sz="2400" i="1" dirty="0"/>
+              <a:t>Some form of presentation</a:t>
+            </a:r>
+          </a:p>
+          <a:p>
+            <a:r>
+              <a:rPr lang="en-US" sz="2400" i="1" dirty="0"/>
+              <a:t>Some “demonstrative coding” along with us</a:t>
+            </a:r>
+          </a:p>
+          <a:p>
+            <a:r>
+              <a:rPr lang="en-US" sz="2400" i="1" dirty="0"/>
+              <a:t>A chance to code on your own!</a:t>
+            </a:r>
+          </a:p>
+          <a:p>
+            <a:pPr marL="0" indent="0">
+              <a:buFont typeface="Arial" panose="020B0604020202020204" pitchFamily="34" charset="0"/>
+              <a:buNone/>
+            </a:pPr>
+            <a:endParaRPr lang="en-US" sz="2400" i="1" dirty="0"/>
+          </a:p>
+        </p:txBody>
+      </p:sp>
+      <p:sp>
+        <p:nvSpPr>
+          <p:cNvPr id="12" name="Content Placeholder 2">
+            <a:extLst>
+              <a:ext uri="{FF2B5EF4-FFF2-40B4-BE49-F238E27FC236}">
+                <a16:creationId xmlns:a16="http://schemas.microsoft.com/office/drawing/2014/main" id="{2EC2A204-9425-5604-71F8-F133292DD80C}"/>
+              </a:ext>
+            </a:extLst>
+          </p:cNvPr>
+          <p:cNvSpPr txBox="1">
+            <a:spLocks/>
+          </p:cNvSpPr>
+          <p:nvPr/>
+        </p:nvSpPr>
+        <p:spPr>
+          <a:xfrm>
+            <a:off x="7506728" y="4559012"/>
+            <a:ext cx="4558429" cy="2188725"/>
+          </a:xfrm>
+          <a:prstGeom prst="rect">
+            <a:avLst/>
+          </a:prstGeom>
+          <a:ln>
+            <a:solidFill>
+              <a:schemeClr val="tx1"/>
+            </a:solidFill>
+          </a:ln>
+        </p:spPr>
+        <p:txBody>
+          <a:bodyPr vert="horz" lIns="91440" tIns="45720" rIns="91440" bIns="45720" rtlCol="0">
+            <a:normAutofit lnSpcReduction="10000"/>
+          </a:bodyPr>
+          <a:lstStyle>
+            <a:lvl1pPr marL="228600" indent="-228600" algn="l" defTabSz="914400" rtl="0" eaLnBrk="1" latinLnBrk="0" hangingPunct="1">
+              <a:lnSpc>
+                <a:spcPct val="90000"/>
+              </a:lnSpc>
+              <a:spcBef>
+                <a:spcPts val="1000"/>
+              </a:spcBef>
+              <a:buFont typeface="Arial" panose="020B0604020202020204" pitchFamily="34" charset="0"/>
+              <a:buChar char="•"/>
+              <a:defRPr sz="2800" kern="1200">
+                <a:solidFill>
+                  <a:schemeClr val="tx1"/>
+                </a:solidFill>
+                <a:latin typeface="+mn-lt"/>
+                <a:ea typeface="+mn-ea"/>
+                <a:cs typeface="+mn-cs"/>
+              </a:defRPr>
+            </a:lvl1pPr>
+            <a:lvl2pPr marL="685800" indent="-228600" algn="l" defTabSz="914400" rtl="0" eaLnBrk="1" latinLnBrk="0" hangingPunct="1">
+              <a:lnSpc>
+                <a:spcPct val="90000"/>
+              </a:lnSpc>
+              <a:spcBef>
+                <a:spcPts val="500"/>
+              </a:spcBef>
+              <a:buFont typeface="Arial" panose="020B0604020202020204" pitchFamily="34" charset="0"/>
+              <a:buChar char="•"/>
+              <a:defRPr sz="2400" kern="1200">
+                <a:solidFill>
+                  <a:schemeClr val="tx1"/>
+                </a:solidFill>
+                <a:latin typeface="+mn-lt"/>
+                <a:ea typeface="+mn-ea"/>
+                <a:cs typeface="+mn-cs"/>
+              </a:defRPr>
+            </a:lvl2pPr>
+            <a:lvl3pPr marL="1143000" indent="-228600" algn="l" defTabSz="914400" rtl="0" eaLnBrk="1" latinLnBrk="0" hangingPunct="1">
+              <a:lnSpc>
+                <a:spcPct val="90000"/>
+              </a:lnSpc>
+              <a:spcBef>
+                <a:spcPts val="500"/>
+              </a:spcBef>
+              <a:buFont typeface="Arial" panose="020B0604020202020204" pitchFamily="34" charset="0"/>
+              <a:buChar char="•"/>
+              <a:defRPr sz="2000" kern="1200">
+                <a:solidFill>
+                  <a:schemeClr val="tx1"/>
+                </a:solidFill>
+                <a:latin typeface="+mn-lt"/>
+                <a:ea typeface="+mn-ea"/>
+                <a:cs typeface="+mn-cs"/>
+              </a:defRPr>
+            </a:lvl3pPr>
+            <a:lvl4pPr marL="1600200" indent="-228600" algn="l" defTabSz="914400" rtl="0" eaLnBrk="1" latinLnBrk="0" hangingPunct="1">
+              <a:lnSpc>
+                <a:spcPct val="90000"/>
+              </a:lnSpc>
+              <a:spcBef>
+                <a:spcPts val="500"/>
+              </a:spcBef>
+              <a:buFont typeface="Arial" panose="020B0604020202020204" pitchFamily="34" charset="0"/>
+              <a:buChar char="•"/>
+              <a:defRPr sz="1800" kern="1200">
+                <a:solidFill>
+                  <a:schemeClr val="tx1"/>
+                </a:solidFill>
+                <a:latin typeface="+mn-lt"/>
+                <a:ea typeface="+mn-ea"/>
+                <a:cs typeface="+mn-cs"/>
+              </a:defRPr>
+            </a:lvl4pPr>
+            <a:lvl5pPr marL="2057400" indent="-228600" algn="l" defTabSz="914400" rtl="0" eaLnBrk="1" latinLnBrk="0" hangingPunct="1">
+              <a:lnSpc>
+                <a:spcPct val="90000"/>
+              </a:lnSpc>
+              <a:spcBef>
+                <a:spcPts val="500"/>
+              </a:spcBef>
+              <a:buFont typeface="Arial" panose="020B0604020202020204" pitchFamily="34" charset="0"/>
+              <a:buChar char="•"/>
+              <a:defRPr sz="1800" kern="1200">
+                <a:solidFill>
+                  <a:schemeClr val="tx1"/>
+                </a:solidFill>
+                <a:latin typeface="+mn-lt"/>
+                <a:ea typeface="+mn-ea"/>
+                <a:cs typeface="+mn-cs"/>
+              </a:defRPr>
+            </a:lvl5pPr>
+            <a:lvl6pPr marL="2514600" indent="-228600" algn="l" defTabSz="914400" rtl="0" eaLnBrk="1" latinLnBrk="0" hangingPunct="1">
+              <a:lnSpc>
+                <a:spcPct val="90000"/>
+              </a:lnSpc>
+              <a:spcBef>
+                <a:spcPts val="500"/>
+              </a:spcBef>
+              <a:buFont typeface="Arial" panose="020B0604020202020204" pitchFamily="34" charset="0"/>
+              <a:buChar char="•"/>
+              <a:defRPr sz="1800" kern="1200">
+                <a:solidFill>
+                  <a:schemeClr val="tx1"/>
+                </a:solidFill>
+                <a:latin typeface="+mn-lt"/>
+                <a:ea typeface="+mn-ea"/>
+                <a:cs typeface="+mn-cs"/>
+              </a:defRPr>
+            </a:lvl6pPr>
+            <a:lvl7pPr marL="2971800" indent="-228600" algn="l" defTabSz="914400" rtl="0" eaLnBrk="1" latinLnBrk="0" hangingPunct="1">
+              <a:lnSpc>
+                <a:spcPct val="90000"/>
+              </a:lnSpc>
+              <a:spcBef>
+                <a:spcPts val="500"/>
+              </a:spcBef>
+              <a:buFont typeface="Arial" panose="020B0604020202020204" pitchFamily="34" charset="0"/>
+              <a:buChar char="•"/>
+              <a:defRPr sz="1800" kern="1200">
+                <a:solidFill>
+                  <a:schemeClr val="tx1"/>
+                </a:solidFill>
+                <a:latin typeface="+mn-lt"/>
+                <a:ea typeface="+mn-ea"/>
+                <a:cs typeface="+mn-cs"/>
+              </a:defRPr>
+            </a:lvl7pPr>
+            <a:lvl8pPr marL="3429000" indent="-228600" algn="l" defTabSz="914400" rtl="0" eaLnBrk="1" latinLnBrk="0" hangingPunct="1">
+              <a:lnSpc>
+                <a:spcPct val="90000"/>
+              </a:lnSpc>
+              <a:spcBef>
+                <a:spcPts val="500"/>
+              </a:spcBef>
+              <a:buFont typeface="Arial" panose="020B0604020202020204" pitchFamily="34" charset="0"/>
+              <a:buChar char="•"/>
+              <a:defRPr sz="1800" kern="1200">
+                <a:solidFill>
+                  <a:schemeClr val="tx1"/>
+                </a:solidFill>
+                <a:latin typeface="+mn-lt"/>
+                <a:ea typeface="+mn-ea"/>
+                <a:cs typeface="+mn-cs"/>
+              </a:defRPr>
+            </a:lvl8pPr>
+            <a:lvl9pPr marL="3886200" indent="-228600" algn="l" defTabSz="914400" rtl="0" eaLnBrk="1" latinLnBrk="0" hangingPunct="1">
+              <a:lnSpc>
+                <a:spcPct val="90000"/>
+              </a:lnSpc>
+              <a:spcBef>
+                <a:spcPts val="500"/>
+              </a:spcBef>
+              <a:buFont typeface="Arial" panose="020B0604020202020204" pitchFamily="34" charset="0"/>
+              <a:buChar char="•"/>
+              <a:defRPr sz="1800" kern="1200">
+                <a:solidFill>
+                  <a:schemeClr val="tx1"/>
+                </a:solidFill>
+                <a:latin typeface="+mn-lt"/>
+                <a:ea typeface="+mn-ea"/>
+                <a:cs typeface="+mn-cs"/>
+              </a:defRPr>
+            </a:lvl9pPr>
+          </a:lstStyle>
+          <a:p>
+            <a:pPr marL="0" indent="0">
+              <a:buFont typeface="Arial" panose="020B0604020202020204" pitchFamily="34" charset="0"/>
+              <a:buNone/>
+            </a:pPr>
+            <a:r>
+              <a:rPr lang="en-US" sz="2400" i="1" dirty="0"/>
+              <a:t>The Project:</a:t>
+            </a:r>
+          </a:p>
+          <a:p>
+            <a:r>
+              <a:rPr lang="en-US" sz="2400" i="1" dirty="0"/>
+              <a:t>Be thinking about some data you’d like to play with</a:t>
+            </a:r>
+          </a:p>
+          <a:p>
+            <a:pPr lvl="1"/>
+            <a:r>
+              <a:rPr lang="en-US" sz="2000" i="1" dirty="0"/>
+              <a:t>…and what you’d like to try</a:t>
+            </a:r>
+          </a:p>
+          <a:p>
+            <a:pPr lvl="1"/>
+            <a:r>
+              <a:rPr lang="en-US" sz="2000" i="1" dirty="0"/>
+              <a:t>…and what problems it might have</a:t>
+            </a:r>
+          </a:p>
+          <a:p>
+            <a:r>
+              <a:rPr lang="en-US" sz="2400" i="1" dirty="0"/>
+              <a:t>(We have some data if you don’t)</a:t>
+            </a:r>
+          </a:p>
+          <a:p>
+            <a:pPr marL="0" indent="0">
+              <a:buFont typeface="Arial" panose="020B0604020202020204" pitchFamily="34" charset="0"/>
+              <a:buNone/>
+            </a:pPr>
+            <a:endParaRPr lang="en-US" sz="2400" i="1" dirty="0"/>
           </a:p>
         </p:txBody>
       </p:sp>
     </p:spTree>
     <p:extLst>
       <p:ext uri="{BB962C8B-B14F-4D97-AF65-F5344CB8AC3E}">
-        <p14:creationId xmlns:p14="http://schemas.microsoft.com/office/powerpoint/2010/main" val="117207130"/>
+        <p14:creationId xmlns:p14="http://schemas.microsoft.com/office/powerpoint/2010/main" val="3983165578"/>
       </p:ext>
     </p:extLst>
   </p:cSld>
@@ -20553,6 +20595,267 @@
                                   </p:childTnLst>
                                 </p:cTn>
                               </p:par>
+                              <p:par>
+                                <p:cTn id="7" presetID="1" presetClass="entr" presetSubtype="0" fill="hold" nodeType="withEffect">
+                                  <p:stCondLst>
+                                    <p:cond delay="0"/>
+                                  </p:stCondLst>
+                                  <p:childTnLst>
+                                    <p:set>
+                                      <p:cBhvr>
+                                        <p:cTn id="8" dur="1" fill="hold">
+                                          <p:stCondLst>
+                                            <p:cond delay="0"/>
+                                          </p:stCondLst>
+                                        </p:cTn>
+                                        <p:tgtEl>
+                                          <p:spTgt spid="5"/>
+                                        </p:tgtEl>
+                                        <p:attrNameLst>
+                                          <p:attrName>style.visibility</p:attrName>
+                                        </p:attrNameLst>
+                                      </p:cBhvr>
+                                      <p:to>
+                                        <p:strVal val="visible"/>
+                                      </p:to>
+                                    </p:set>
+                                  </p:childTnLst>
+                                </p:cTn>
+                              </p:par>
+                            </p:childTnLst>
+                          </p:cTn>
+                        </p:par>
+                      </p:childTnLst>
+                    </p:cTn>
+                  </p:par>
+                  <p:par>
+                    <p:cTn id="9" fill="hold">
+                      <p:stCondLst>
+                        <p:cond delay="indefinite"/>
+                      </p:stCondLst>
+                      <p:childTnLst>
+                        <p:par>
+                          <p:cTn id="10" fill="hold">
+                            <p:stCondLst>
+                              <p:cond delay="0"/>
+                            </p:stCondLst>
+                            <p:childTnLst>
+                              <p:par>
+                                <p:cTn id="11" presetID="1" presetClass="entr" presetSubtype="0" fill="hold" nodeType="clickEffect">
+                                  <p:stCondLst>
+                                    <p:cond delay="0"/>
+                                  </p:stCondLst>
+                                  <p:childTnLst>
+                                    <p:set>
+                                      <p:cBhvr>
+                                        <p:cTn id="12" dur="1" fill="hold">
+                                          <p:stCondLst>
+                                            <p:cond delay="0"/>
+                                          </p:stCondLst>
+                                        </p:cTn>
+                                        <p:tgtEl>
+                                          <p:spTgt spid="4"/>
+                                        </p:tgtEl>
+                                        <p:attrNameLst>
+                                          <p:attrName>style.visibility</p:attrName>
+                                        </p:attrNameLst>
+                                      </p:cBhvr>
+                                      <p:to>
+                                        <p:strVal val="visible"/>
+                                      </p:to>
+                                    </p:set>
+                                  </p:childTnLst>
+                                </p:cTn>
+                              </p:par>
+                              <p:par>
+                                <p:cTn id="13" presetID="1" presetClass="entr" presetSubtype="0" fill="hold" grpId="0" nodeType="withEffect">
+                                  <p:stCondLst>
+                                    <p:cond delay="0"/>
+                                  </p:stCondLst>
+                                  <p:childTnLst>
+                                    <p:set>
+                                      <p:cBhvr>
+                                        <p:cTn id="14" dur="1" fill="hold">
+                                          <p:stCondLst>
+                                            <p:cond delay="0"/>
+                                          </p:stCondLst>
+                                        </p:cTn>
+                                        <p:tgtEl>
+                                          <p:spTgt spid="8"/>
+                                        </p:tgtEl>
+                                        <p:attrNameLst>
+                                          <p:attrName>style.visibility</p:attrName>
+                                        </p:attrNameLst>
+                                      </p:cBhvr>
+                                      <p:to>
+                                        <p:strVal val="visible"/>
+                                      </p:to>
+                                    </p:set>
+                                  </p:childTnLst>
+                                </p:cTn>
+                              </p:par>
+                            </p:childTnLst>
+                          </p:cTn>
+                        </p:par>
+                      </p:childTnLst>
+                    </p:cTn>
+                  </p:par>
+                  <p:par>
+                    <p:cTn id="15" fill="hold">
+                      <p:stCondLst>
+                        <p:cond delay="indefinite"/>
+                      </p:stCondLst>
+                      <p:childTnLst>
+                        <p:par>
+                          <p:cTn id="16" fill="hold">
+                            <p:stCondLst>
+                              <p:cond delay="0"/>
+                            </p:stCondLst>
+                            <p:childTnLst>
+                              <p:par>
+                                <p:cTn id="17" presetID="1" presetClass="entr" presetSubtype="0" fill="hold" nodeType="clickEffect">
+                                  <p:stCondLst>
+                                    <p:cond delay="0"/>
+                                  </p:stCondLst>
+                                  <p:childTnLst>
+                                    <p:set>
+                                      <p:cBhvr>
+                                        <p:cTn id="18" dur="1" fill="hold">
+                                          <p:stCondLst>
+                                            <p:cond delay="0"/>
+                                          </p:stCondLst>
+                                        </p:cTn>
+                                        <p:tgtEl>
+                                          <p:spTgt spid="6"/>
+                                        </p:tgtEl>
+                                        <p:attrNameLst>
+                                          <p:attrName>style.visibility</p:attrName>
+                                        </p:attrNameLst>
+                                      </p:cBhvr>
+                                      <p:to>
+                                        <p:strVal val="visible"/>
+                                      </p:to>
+                                    </p:set>
+                                  </p:childTnLst>
+                                </p:cTn>
+                              </p:par>
+                              <p:par>
+                                <p:cTn id="19" presetID="1" presetClass="entr" presetSubtype="0" fill="hold" grpId="0" nodeType="withEffect">
+                                  <p:stCondLst>
+                                    <p:cond delay="0"/>
+                                  </p:stCondLst>
+                                  <p:childTnLst>
+                                    <p:set>
+                                      <p:cBhvr>
+                                        <p:cTn id="20" dur="1" fill="hold">
+                                          <p:stCondLst>
+                                            <p:cond delay="0"/>
+                                          </p:stCondLst>
+                                        </p:cTn>
+                                        <p:tgtEl>
+                                          <p:spTgt spid="9"/>
+                                        </p:tgtEl>
+                                        <p:attrNameLst>
+                                          <p:attrName>style.visibility</p:attrName>
+                                        </p:attrNameLst>
+                                      </p:cBhvr>
+                                      <p:to>
+                                        <p:strVal val="visible"/>
+                                      </p:to>
+                                    </p:set>
+                                  </p:childTnLst>
+                                </p:cTn>
+                              </p:par>
+                            </p:childTnLst>
+                          </p:cTn>
+                        </p:par>
+                      </p:childTnLst>
+                    </p:cTn>
+                  </p:par>
+                  <p:par>
+                    <p:cTn id="21" fill="hold">
+                      <p:stCondLst>
+                        <p:cond delay="indefinite"/>
+                      </p:stCondLst>
+                      <p:childTnLst>
+                        <p:par>
+                          <p:cTn id="22" fill="hold">
+                            <p:stCondLst>
+                              <p:cond delay="0"/>
+                            </p:stCondLst>
+                            <p:childTnLst>
+                              <p:par>
+                                <p:cTn id="23" presetID="1" presetClass="entr" presetSubtype="0" fill="hold" grpId="0" nodeType="clickEffect">
+                                  <p:stCondLst>
+                                    <p:cond delay="0"/>
+                                  </p:stCondLst>
+                                  <p:childTnLst>
+                                    <p:set>
+                                      <p:cBhvr>
+                                        <p:cTn id="24" dur="1" fill="hold">
+                                          <p:stCondLst>
+                                            <p:cond delay="0"/>
+                                          </p:stCondLst>
+                                        </p:cTn>
+                                        <p:tgtEl>
+                                          <p:spTgt spid="11"/>
+                                        </p:tgtEl>
+                                        <p:attrNameLst>
+                                          <p:attrName>style.visibility</p:attrName>
+                                        </p:attrNameLst>
+                                      </p:cBhvr>
+                                      <p:to>
+                                        <p:strVal val="visible"/>
+                                      </p:to>
+                                    </p:set>
+                                  </p:childTnLst>
+                                </p:cTn>
+                              </p:par>
+                            </p:childTnLst>
+                          </p:cTn>
+                        </p:par>
+                      </p:childTnLst>
+                    </p:cTn>
+                  </p:par>
+                  <p:par>
+                    <p:cTn id="25" fill="hold">
+                      <p:stCondLst>
+                        <p:cond delay="indefinite"/>
+                      </p:stCondLst>
+                      <p:childTnLst>
+                        <p:par>
+                          <p:cTn id="26" fill="hold">
+                            <p:stCondLst>
+                              <p:cond delay="0"/>
+                            </p:stCondLst>
+                            <p:childTnLst>
+                              <p:par>
+                                <p:cTn id="27" presetID="1" presetClass="entr" presetSubtype="0" fill="hold" grpId="0" nodeType="clickEffect">
+                                  <p:stCondLst>
+                                    <p:cond delay="0"/>
+                                  </p:stCondLst>
+                                  <p:childTnLst>
+                                    <p:set>
+                                      <p:cBhvr>
+                                        <p:cTn id="28" dur="1" fill="hold">
+                                          <p:stCondLst>
+                                            <p:cond delay="0"/>
+                                          </p:stCondLst>
+                                        </p:cTn>
+                                        <p:tgtEl>
+                                          <p:spTgt spid="12"/>
+                                        </p:tgtEl>
+                                        <p:attrNameLst>
+                                          <p:attrName>style.visibility</p:attrName>
+                                        </p:attrNameLst>
+                                      </p:cBhvr>
+                                      <p:to>
+                                        <p:strVal val="visible"/>
+                                      </p:to>
+                                    </p:set>
+                                  </p:childTnLst>
+                                </p:cTn>
+                              </p:par>
                             </p:childTnLst>
                           </p:cTn>
                         </p:par>
@@ -20582,12 +20885,16 @@
     </p:tnLst>
     <p:bldLst>
       <p:bldP spid="7" grpId="0"/>
+      <p:bldP spid="8" grpId="0"/>
+      <p:bldP spid="9" grpId="0"/>
+      <p:bldP spid="11" grpId="0"/>
+      <p:bldP spid="12" grpId="0"/>
     </p:bldLst>
   </p:timing>
 </p:sld>
 </file>
 
-<file path=ppt/slides/slide9.xml><?xml version="1.0" encoding="utf-8"?>
+<file path=ppt/slides/slide8.xml><?xml version="1.0" encoding="utf-8"?>
 <p:sld xmlns:a="http://schemas.openxmlformats.org/drawingml/2006/main" xmlns:r="http://schemas.openxmlformats.org/officeDocument/2006/relationships" xmlns:p="http://schemas.openxmlformats.org/presentationml/2006/main">
   <p:cSld>
     <p:spTree>
@@ -21599,6 +21906,96 @@
       </p:par>
     </p:tnLst>
   </p:timing>
+</p:sld>
+</file>
+
+<file path=ppt/slides/slide9.xml><?xml version="1.0" encoding="utf-8"?>
+<p:sld xmlns:a="http://schemas.openxmlformats.org/drawingml/2006/main" xmlns:r="http://schemas.openxmlformats.org/officeDocument/2006/relationships" xmlns:p="http://schemas.openxmlformats.org/presentationml/2006/main">
+  <p:cSld>
+    <p:spTree>
+      <p:nvGrpSpPr>
+        <p:cNvPr id="1" name=""/>
+        <p:cNvGrpSpPr/>
+        <p:nvPr/>
+      </p:nvGrpSpPr>
+      <p:grpSpPr>
+        <a:xfrm>
+          <a:off x="0" y="0"/>
+          <a:ext cx="0" cy="0"/>
+          <a:chOff x="0" y="0"/>
+          <a:chExt cx="0" cy="0"/>
+        </a:xfrm>
+      </p:grpSpPr>
+      <p:sp>
+        <p:nvSpPr>
+          <p:cNvPr id="2" name="Title 1">
+            <a:extLst>
+              <a:ext uri="{FF2B5EF4-FFF2-40B4-BE49-F238E27FC236}">
+                <a16:creationId xmlns:a16="http://schemas.microsoft.com/office/drawing/2014/main" id="{ACD980A7-0204-9CD9-DCFC-61FE609FD2F7}"/>
+              </a:ext>
+            </a:extLst>
+          </p:cNvPr>
+          <p:cNvSpPr>
+            <a:spLocks noGrp="1"/>
+          </p:cNvSpPr>
+          <p:nvPr>
+            <p:ph type="title"/>
+          </p:nvPr>
+        </p:nvSpPr>
+        <p:spPr/>
+        <p:txBody>
+          <a:bodyPr/>
+          <a:lstStyle/>
+          <a:p>
+            <a:endParaRPr lang="en-US"/>
+          </a:p>
+        </p:txBody>
+      </p:sp>
+      <p:pic>
+        <p:nvPicPr>
+          <p:cNvPr id="5" name="Content Placeholder 4" descr="A cartoon character with a yellow background&#10;&#10;Description automatically generated">
+            <a:extLst>
+              <a:ext uri="{FF2B5EF4-FFF2-40B4-BE49-F238E27FC236}">
+                <a16:creationId xmlns:a16="http://schemas.microsoft.com/office/drawing/2014/main" id="{F9E65229-512E-C113-6DD1-939F9FBC6A1F}"/>
+              </a:ext>
+            </a:extLst>
+          </p:cNvPr>
+          <p:cNvPicPr>
+            <a:picLocks noGrp="1" noChangeAspect="1"/>
+          </p:cNvPicPr>
+          <p:nvPr>
+            <p:ph idx="1"/>
+          </p:nvPr>
+        </p:nvPicPr>
+        <p:blipFill>
+          <a:blip r:embed="rId3">
+            <a:extLst>
+              <a:ext uri="{28A0092B-C50C-407E-A947-70E740481C1C}">
+                <a14:useLocalDpi xmlns:a14="http://schemas.microsoft.com/office/drawing/2010/main" val="0"/>
+              </a:ext>
+            </a:extLst>
+          </a:blip>
+          <a:stretch>
+            <a:fillRect/>
+          </a:stretch>
+        </p:blipFill>
+        <p:spPr>
+          <a:xfrm>
+            <a:off x="2748817" y="1825625"/>
+            <a:ext cx="6694366" cy="4351338"/>
+          </a:xfrm>
+        </p:spPr>
+      </p:pic>
+    </p:spTree>
+    <p:extLst>
+      <p:ext uri="{BB962C8B-B14F-4D97-AF65-F5344CB8AC3E}">
+        <p14:creationId xmlns:p14="http://schemas.microsoft.com/office/powerpoint/2010/main" val="2635761389"/>
+      </p:ext>
+    </p:extLst>
+  </p:cSld>
+  <p:clrMapOvr>
+    <a:masterClrMapping/>
+  </p:clrMapOvr>
 </p:sld>
 </file>
 

</xml_diff>